<commit_message>
Need someone to put in install instructions i have no idea
</commit_message>
<xml_diff>
--- a/Manual assets/maNUAL.pptx
+++ b/Manual assets/maNUAL.pptx
@@ -230,7 +230,7 @@
           <a:p>
             <a:fld id="{EE925A61-AA46-415A-BCE7-79C31DFEF946}" type="datetimeFigureOut">
               <a:rPr lang="en-US" smtClean="0"/>
-              <a:t>1/11/2023</a:t>
+              <a:t>1/12/2023</a:t>
             </a:fld>
             <a:endParaRPr lang="en-US"/>
           </a:p>
@@ -407,7 +407,7 @@
           <a:p>
             <a:fld id="{03E1A8B6-03F1-4F47-9B71-71E95E05BBC2}" type="datetimeFigureOut">
               <a:rPr lang="en-US" smtClean="0"/>
-              <a:t>1/11/2023</a:t>
+              <a:t>1/12/2023</a:t>
             </a:fld>
             <a:endParaRPr lang="en-US"/>
           </a:p>
@@ -1156,7 +1156,7 @@
           <a:p>
             <a:fld id="{B903D72C-80A7-40E3-B3FB-899225B9DF94}" type="datetimeFigureOut">
               <a:rPr lang="en-US" smtClean="0"/>
-              <a:t>1/11/2023</a:t>
+              <a:t>1/12/2023</a:t>
             </a:fld>
             <a:endParaRPr lang="en-US"/>
           </a:p>
@@ -1326,7 +1326,7 @@
           <a:p>
             <a:fld id="{B903D72C-80A7-40E3-B3FB-899225B9DF94}" type="datetimeFigureOut">
               <a:rPr lang="en-US" smtClean="0"/>
-              <a:t>1/11/2023</a:t>
+              <a:t>1/12/2023</a:t>
             </a:fld>
             <a:endParaRPr lang="en-US"/>
           </a:p>
@@ -1506,7 +1506,7 @@
           <a:p>
             <a:fld id="{B903D72C-80A7-40E3-B3FB-899225B9DF94}" type="datetimeFigureOut">
               <a:rPr lang="en-US" smtClean="0"/>
-              <a:t>1/11/2023</a:t>
+              <a:t>1/12/2023</a:t>
             </a:fld>
             <a:endParaRPr lang="en-US"/>
           </a:p>
@@ -1676,7 +1676,7 @@
           <a:p>
             <a:fld id="{B903D72C-80A7-40E3-B3FB-899225B9DF94}" type="datetimeFigureOut">
               <a:rPr lang="en-US" smtClean="0"/>
-              <a:t>1/11/2023</a:t>
+              <a:t>1/12/2023</a:t>
             </a:fld>
             <a:endParaRPr lang="en-US"/>
           </a:p>
@@ -1920,7 +1920,7 @@
           <a:p>
             <a:fld id="{B903D72C-80A7-40E3-B3FB-899225B9DF94}" type="datetimeFigureOut">
               <a:rPr lang="en-US" smtClean="0"/>
-              <a:t>1/11/2023</a:t>
+              <a:t>1/12/2023</a:t>
             </a:fld>
             <a:endParaRPr lang="en-US"/>
           </a:p>
@@ -2152,7 +2152,7 @@
           <a:p>
             <a:fld id="{B903D72C-80A7-40E3-B3FB-899225B9DF94}" type="datetimeFigureOut">
               <a:rPr lang="en-US" smtClean="0"/>
-              <a:t>1/11/2023</a:t>
+              <a:t>1/12/2023</a:t>
             </a:fld>
             <a:endParaRPr lang="en-US"/>
           </a:p>
@@ -2519,7 +2519,7 @@
           <a:p>
             <a:fld id="{B903D72C-80A7-40E3-B3FB-899225B9DF94}" type="datetimeFigureOut">
               <a:rPr lang="en-US" smtClean="0"/>
-              <a:t>1/11/2023</a:t>
+              <a:t>1/12/2023</a:t>
             </a:fld>
             <a:endParaRPr lang="en-US"/>
           </a:p>
@@ -2637,7 +2637,7 @@
           <a:p>
             <a:fld id="{B903D72C-80A7-40E3-B3FB-899225B9DF94}" type="datetimeFigureOut">
               <a:rPr lang="en-US" smtClean="0"/>
-              <a:t>1/11/2023</a:t>
+              <a:t>1/12/2023</a:t>
             </a:fld>
             <a:endParaRPr lang="en-US"/>
           </a:p>
@@ -2732,7 +2732,7 @@
           <a:p>
             <a:fld id="{B903D72C-80A7-40E3-B3FB-899225B9DF94}" type="datetimeFigureOut">
               <a:rPr lang="en-US" smtClean="0"/>
-              <a:t>1/11/2023</a:t>
+              <a:t>1/12/2023</a:t>
             </a:fld>
             <a:endParaRPr lang="en-US"/>
           </a:p>
@@ -3009,7 +3009,7 @@
           <a:p>
             <a:fld id="{B903D72C-80A7-40E3-B3FB-899225B9DF94}" type="datetimeFigureOut">
               <a:rPr lang="en-US" smtClean="0"/>
-              <a:t>1/11/2023</a:t>
+              <a:t>1/12/2023</a:t>
             </a:fld>
             <a:endParaRPr lang="en-US"/>
           </a:p>
@@ -3266,7 +3266,7 @@
           <a:p>
             <a:fld id="{B903D72C-80A7-40E3-B3FB-899225B9DF94}" type="datetimeFigureOut">
               <a:rPr lang="en-US" smtClean="0"/>
-              <a:t>1/11/2023</a:t>
+              <a:t>1/12/2023</a:t>
             </a:fld>
             <a:endParaRPr lang="en-US"/>
           </a:p>
@@ -3479,7 +3479,7 @@
           <a:p>
             <a:fld id="{B903D72C-80A7-40E3-B3FB-899225B9DF94}" type="datetimeFigureOut">
               <a:rPr lang="en-US" smtClean="0"/>
-              <a:t>1/11/2023</a:t>
+              <a:t>1/12/2023</a:t>
             </a:fld>
             <a:endParaRPr lang="en-US"/>
           </a:p>
@@ -4322,6 +4322,586 @@
       </p:grpSpPr>
       <p:sp>
         <p:nvSpPr>
+          <p:cNvPr id="25" name="Rectangle: Rounded Corners 24">
+            <a:extLst>
+              <a:ext uri="{FF2B5EF4-FFF2-40B4-BE49-F238E27FC236}">
+                <a16:creationId xmlns:a16="http://schemas.microsoft.com/office/drawing/2014/main" id="{88973BC0-7190-D516-65FB-2183A52658FB}"/>
+              </a:ext>
+            </a:extLst>
+          </p:cNvPr>
+          <p:cNvSpPr/>
+          <p:nvPr/>
+        </p:nvSpPr>
+        <p:spPr>
+          <a:xfrm>
+            <a:off x="-963820" y="304011"/>
+            <a:ext cx="6081251" cy="1393371"/>
+          </a:xfrm>
+          <a:prstGeom prst="roundRect">
+            <a:avLst>
+              <a:gd name="adj" fmla="val 50000"/>
+            </a:avLst>
+          </a:prstGeom>
+        </p:spPr>
+        <p:style>
+          <a:lnRef idx="2">
+            <a:schemeClr val="accent1">
+              <a:shade val="50000"/>
+            </a:schemeClr>
+          </a:lnRef>
+          <a:fillRef idx="1">
+            <a:schemeClr val="accent1"/>
+          </a:fillRef>
+          <a:effectRef idx="0">
+            <a:schemeClr val="accent1"/>
+          </a:effectRef>
+          <a:fontRef idx="minor">
+            <a:schemeClr val="lt1"/>
+          </a:fontRef>
+        </p:style>
+        <p:txBody>
+          <a:bodyPr rtlCol="0" anchor="ctr"/>
+          <a:lstStyle/>
+          <a:p>
+            <a:pPr algn="ctr"/>
+            <a:endParaRPr lang="en-US"/>
+          </a:p>
+        </p:txBody>
+      </p:sp>
+      <p:sp>
+        <p:nvSpPr>
+          <p:cNvPr id="22" name="Ribbon: Curved and Tilted Up 21">
+            <a:extLst>
+              <a:ext uri="{FF2B5EF4-FFF2-40B4-BE49-F238E27FC236}">
+                <a16:creationId xmlns:a16="http://schemas.microsoft.com/office/drawing/2014/main" id="{4B9944BC-05A4-F457-BD38-1390E8ED0FE3}"/>
+              </a:ext>
+            </a:extLst>
+          </p:cNvPr>
+          <p:cNvSpPr/>
+          <p:nvPr/>
+        </p:nvSpPr>
+        <p:spPr>
+          <a:xfrm>
+            <a:off x="3403186" y="2566237"/>
+            <a:ext cx="2608594" cy="1634573"/>
+          </a:xfrm>
+          <a:prstGeom prst="ellipseRibbon2">
+            <a:avLst/>
+          </a:prstGeom>
+        </p:spPr>
+        <p:style>
+          <a:lnRef idx="1">
+            <a:schemeClr val="accent4"/>
+          </a:lnRef>
+          <a:fillRef idx="2">
+            <a:schemeClr val="accent4"/>
+          </a:fillRef>
+          <a:effectRef idx="1">
+            <a:schemeClr val="accent4"/>
+          </a:effectRef>
+          <a:fontRef idx="minor">
+            <a:schemeClr val="dk1"/>
+          </a:fontRef>
+        </p:style>
+        <p:txBody>
+          <a:bodyPr rtlCol="0" anchor="ctr"/>
+          <a:lstStyle/>
+          <a:p>
+            <a:pPr algn="ctr"/>
+            <a:endParaRPr lang="en-US"/>
+          </a:p>
+        </p:txBody>
+      </p:sp>
+      <p:sp>
+        <p:nvSpPr>
+          <p:cNvPr id="21" name="Star: 7 Points 20">
+            <a:extLst>
+              <a:ext uri="{FF2B5EF4-FFF2-40B4-BE49-F238E27FC236}">
+                <a16:creationId xmlns:a16="http://schemas.microsoft.com/office/drawing/2014/main" id="{04BCD815-DAE3-C95A-C597-4F7173651BCB}"/>
+              </a:ext>
+            </a:extLst>
+          </p:cNvPr>
+          <p:cNvSpPr/>
+          <p:nvPr/>
+        </p:nvSpPr>
+        <p:spPr>
+          <a:xfrm flipV="1">
+            <a:off x="369158" y="6455322"/>
+            <a:ext cx="3325103" cy="2565332"/>
+          </a:xfrm>
+          <a:prstGeom prst="star7">
+            <a:avLst>
+              <a:gd name="adj" fmla="val 20930"/>
+              <a:gd name="hf" fmla="val 102572"/>
+              <a:gd name="vf" fmla="val 105210"/>
+            </a:avLst>
+          </a:prstGeom>
+          <a:ln>
+            <a:noFill/>
+          </a:ln>
+        </p:spPr>
+        <p:style>
+          <a:lnRef idx="3">
+            <a:schemeClr val="lt1"/>
+          </a:lnRef>
+          <a:fillRef idx="1">
+            <a:schemeClr val="accent2"/>
+          </a:fillRef>
+          <a:effectRef idx="1">
+            <a:schemeClr val="accent2"/>
+          </a:effectRef>
+          <a:fontRef idx="minor">
+            <a:schemeClr val="lt1"/>
+          </a:fontRef>
+        </p:style>
+        <p:txBody>
+          <a:bodyPr rtlCol="0" anchor="ctr"/>
+          <a:lstStyle/>
+          <a:p>
+            <a:pPr algn="ctr"/>
+            <a:endParaRPr lang="en-US"/>
+          </a:p>
+        </p:txBody>
+      </p:sp>
+      <p:sp>
+        <p:nvSpPr>
+          <p:cNvPr id="19" name="Star: 5 Points 18">
+            <a:extLst>
+              <a:ext uri="{FF2B5EF4-FFF2-40B4-BE49-F238E27FC236}">
+                <a16:creationId xmlns:a16="http://schemas.microsoft.com/office/drawing/2014/main" id="{65B77AFA-4910-6217-0975-F33B3B23F5F4}"/>
+              </a:ext>
+            </a:extLst>
+          </p:cNvPr>
+          <p:cNvSpPr/>
+          <p:nvPr/>
+        </p:nvSpPr>
+        <p:spPr>
+          <a:xfrm>
+            <a:off x="573129" y="1925553"/>
+            <a:ext cx="2405315" cy="2342147"/>
+          </a:xfrm>
+          <a:prstGeom prst="star5">
+            <a:avLst/>
+          </a:prstGeom>
+        </p:spPr>
+        <p:style>
+          <a:lnRef idx="1">
+            <a:schemeClr val="accent4"/>
+          </a:lnRef>
+          <a:fillRef idx="2">
+            <a:schemeClr val="accent4"/>
+          </a:fillRef>
+          <a:effectRef idx="1">
+            <a:schemeClr val="accent4"/>
+          </a:effectRef>
+          <a:fontRef idx="minor">
+            <a:schemeClr val="dk1"/>
+          </a:fontRef>
+        </p:style>
+        <p:txBody>
+          <a:bodyPr rtlCol="0" anchor="ctr"/>
+          <a:lstStyle/>
+          <a:p>
+            <a:pPr algn="ctr"/>
+            <a:endParaRPr lang="en-US"/>
+          </a:p>
+        </p:txBody>
+      </p:sp>
+      <p:sp>
+        <p:nvSpPr>
+          <p:cNvPr id="18" name="Rectangle 17">
+            <a:extLst>
+              <a:ext uri="{FF2B5EF4-FFF2-40B4-BE49-F238E27FC236}">
+                <a16:creationId xmlns:a16="http://schemas.microsoft.com/office/drawing/2014/main" id="{F54F3A0B-8F71-FE0F-59AF-1A77CA4B8C87}"/>
+              </a:ext>
+            </a:extLst>
+          </p:cNvPr>
+          <p:cNvSpPr/>
+          <p:nvPr/>
+        </p:nvSpPr>
+        <p:spPr>
+          <a:xfrm>
+            <a:off x="3639052" y="5745366"/>
+            <a:ext cx="2185737" cy="1914702"/>
+          </a:xfrm>
+          <a:prstGeom prst="rect">
+            <a:avLst/>
+          </a:prstGeom>
+        </p:spPr>
+        <p:style>
+          <a:lnRef idx="1">
+            <a:schemeClr val="accent3"/>
+          </a:lnRef>
+          <a:fillRef idx="2">
+            <a:schemeClr val="accent3"/>
+          </a:fillRef>
+          <a:effectRef idx="1">
+            <a:schemeClr val="accent3"/>
+          </a:effectRef>
+          <a:fontRef idx="minor">
+            <a:schemeClr val="dk1"/>
+          </a:fontRef>
+        </p:style>
+        <p:txBody>
+          <a:bodyPr rtlCol="0" anchor="ctr"/>
+          <a:lstStyle/>
+          <a:p>
+            <a:pPr algn="ctr"/>
+            <a:endParaRPr lang="en-US"/>
+          </a:p>
+        </p:txBody>
+      </p:sp>
+      <p:sp>
+        <p:nvSpPr>
+          <p:cNvPr id="15" name="Rectangle 14">
+            <a:extLst>
+              <a:ext uri="{FF2B5EF4-FFF2-40B4-BE49-F238E27FC236}">
+                <a16:creationId xmlns:a16="http://schemas.microsoft.com/office/drawing/2014/main" id="{4AE67B1E-CFA1-8620-BF74-BEDC79E5A54E}"/>
+              </a:ext>
+            </a:extLst>
+          </p:cNvPr>
+          <p:cNvSpPr/>
+          <p:nvPr/>
+        </p:nvSpPr>
+        <p:spPr>
+          <a:xfrm>
+            <a:off x="3525253" y="3769896"/>
+            <a:ext cx="2486527" cy="1634574"/>
+          </a:xfrm>
+          <a:prstGeom prst="rect">
+            <a:avLst/>
+          </a:prstGeom>
+        </p:spPr>
+        <p:style>
+          <a:lnRef idx="1">
+            <a:schemeClr val="accent3"/>
+          </a:lnRef>
+          <a:fillRef idx="2">
+            <a:schemeClr val="accent3"/>
+          </a:fillRef>
+          <a:effectRef idx="1">
+            <a:schemeClr val="accent3"/>
+          </a:effectRef>
+          <a:fontRef idx="minor">
+            <a:schemeClr val="dk1"/>
+          </a:fontRef>
+        </p:style>
+        <p:txBody>
+          <a:bodyPr rtlCol="0" anchor="ctr"/>
+          <a:lstStyle/>
+          <a:p>
+            <a:pPr algn="ctr"/>
+            <a:endParaRPr lang="en-US"/>
+          </a:p>
+        </p:txBody>
+      </p:sp>
+      <p:sp>
+        <p:nvSpPr>
+          <p:cNvPr id="11" name="Rectangle 10">
+            <a:extLst>
+              <a:ext uri="{FF2B5EF4-FFF2-40B4-BE49-F238E27FC236}">
+                <a16:creationId xmlns:a16="http://schemas.microsoft.com/office/drawing/2014/main" id="{D33934C0-1743-FC8E-D169-CBE6A7C3E397}"/>
+              </a:ext>
+            </a:extLst>
+          </p:cNvPr>
+          <p:cNvSpPr/>
+          <p:nvPr/>
+        </p:nvSpPr>
+        <p:spPr>
+          <a:xfrm>
+            <a:off x="471490" y="3769895"/>
+            <a:ext cx="2608594" cy="2515137"/>
+          </a:xfrm>
+          <a:prstGeom prst="rect">
+            <a:avLst/>
+          </a:prstGeom>
+        </p:spPr>
+        <p:style>
+          <a:lnRef idx="1">
+            <a:schemeClr val="accent3"/>
+          </a:lnRef>
+          <a:fillRef idx="2">
+            <a:schemeClr val="accent3"/>
+          </a:fillRef>
+          <a:effectRef idx="1">
+            <a:schemeClr val="accent3"/>
+          </a:effectRef>
+          <a:fontRef idx="minor">
+            <a:schemeClr val="dk1"/>
+          </a:fontRef>
+        </p:style>
+        <p:txBody>
+          <a:bodyPr rtlCol="0" anchor="ctr"/>
+          <a:lstStyle/>
+          <a:p>
+            <a:pPr algn="ctr"/>
+            <a:endParaRPr lang="en-US"/>
+          </a:p>
+        </p:txBody>
+      </p:sp>
+      <p:sp>
+        <p:nvSpPr>
+          <p:cNvPr id="4" name="TextBox 3">
+            <a:extLst>
+              <a:ext uri="{FF2B5EF4-FFF2-40B4-BE49-F238E27FC236}">
+                <a16:creationId xmlns:a16="http://schemas.microsoft.com/office/drawing/2014/main" id="{80484F1A-3F4B-16AE-4F2A-F973FBFBC2EC}"/>
+              </a:ext>
+            </a:extLst>
+          </p:cNvPr>
+          <p:cNvSpPr txBox="1"/>
+          <p:nvPr/>
+        </p:nvSpPr>
+        <p:spPr>
+          <a:xfrm>
+            <a:off x="471490" y="3769895"/>
+            <a:ext cx="2608594" cy="2862322"/>
+          </a:xfrm>
+          <a:prstGeom prst="rect">
+            <a:avLst/>
+          </a:prstGeom>
+          <a:noFill/>
+        </p:spPr>
+        <p:txBody>
+          <a:bodyPr wrap="square" rtlCol="0">
+            <a:spAutoFit/>
+          </a:bodyPr>
+          <a:lstStyle/>
+          <a:p>
+            <a:r>
+              <a:rPr lang="en-US" b="1" dirty="0">
+                <a:latin typeface="Times New Roman" panose="02020603050405020304" pitchFamily="18" charset="0"/>
+                <a:cs typeface="Times New Roman" panose="02020603050405020304" pitchFamily="18" charset="0"/>
+              </a:rPr>
+              <a:t>Goblin</a:t>
+            </a:r>
+            <a:r>
+              <a:rPr lang="en-US" dirty="0">
+                <a:latin typeface="Times New Roman" panose="02020603050405020304" pitchFamily="18" charset="0"/>
+                <a:cs typeface="Times New Roman" panose="02020603050405020304" pitchFamily="18" charset="0"/>
+              </a:rPr>
+              <a:t>: Honestly, these guys would be friendly but panic far too easily after they start panicking, they fire rocks out of their mouth. Be careful, while Craig can cut down these rocks, goblins can fire faster than he can swing.</a:t>
+            </a:r>
+          </a:p>
+          <a:p>
+            <a:endParaRPr lang="en-US" dirty="0">
+              <a:latin typeface="Times New Roman" panose="02020603050405020304" pitchFamily="18" charset="0"/>
+              <a:cs typeface="Times New Roman" panose="02020603050405020304" pitchFamily="18" charset="0"/>
+            </a:endParaRPr>
+          </a:p>
+        </p:txBody>
+      </p:sp>
+      <p:sp>
+        <p:nvSpPr>
+          <p:cNvPr id="5" name="TextBox 4">
+            <a:extLst>
+              <a:ext uri="{FF2B5EF4-FFF2-40B4-BE49-F238E27FC236}">
+                <a16:creationId xmlns:a16="http://schemas.microsoft.com/office/drawing/2014/main" id="{F07F5C49-0D65-3285-A5F9-5B7CD401A05D}"/>
+              </a:ext>
+            </a:extLst>
+          </p:cNvPr>
+          <p:cNvSpPr txBox="1"/>
+          <p:nvPr/>
+        </p:nvSpPr>
+        <p:spPr>
+          <a:xfrm>
+            <a:off x="3633538" y="3880468"/>
+            <a:ext cx="2269956" cy="1754326"/>
+          </a:xfrm>
+          <a:prstGeom prst="rect">
+            <a:avLst/>
+          </a:prstGeom>
+          <a:noFill/>
+        </p:spPr>
+        <p:txBody>
+          <a:bodyPr wrap="square" rtlCol="0">
+            <a:spAutoFit/>
+          </a:bodyPr>
+          <a:lstStyle/>
+          <a:p>
+            <a:r>
+              <a:rPr lang="en-US" b="1" dirty="0">
+                <a:latin typeface="Times New Roman" panose="02020603050405020304" pitchFamily="18" charset="0"/>
+                <a:cs typeface="Times New Roman" panose="02020603050405020304" pitchFamily="18" charset="0"/>
+              </a:rPr>
+              <a:t>Slime: </a:t>
+            </a:r>
+            <a:r>
+              <a:rPr lang="en-US" dirty="0">
+                <a:latin typeface="Times New Roman" panose="02020603050405020304" pitchFamily="18" charset="0"/>
+                <a:cs typeface="Times New Roman" panose="02020603050405020304" pitchFamily="18" charset="0"/>
+              </a:rPr>
+              <a:t>they’re completely attention starved. They will run at you relentlessly until killed.</a:t>
+            </a:r>
+          </a:p>
+          <a:p>
+            <a:endParaRPr lang="en-US" dirty="0">
+              <a:latin typeface="Times New Roman" panose="02020603050405020304" pitchFamily="18" charset="0"/>
+              <a:cs typeface="Times New Roman" panose="02020603050405020304" pitchFamily="18" charset="0"/>
+            </a:endParaRPr>
+          </a:p>
+        </p:txBody>
+      </p:sp>
+      <p:sp>
+        <p:nvSpPr>
+          <p:cNvPr id="6" name="TextBox 5">
+            <a:extLst>
+              <a:ext uri="{FF2B5EF4-FFF2-40B4-BE49-F238E27FC236}">
+                <a16:creationId xmlns:a16="http://schemas.microsoft.com/office/drawing/2014/main" id="{15840A52-259D-549C-5AA0-6C06A35A8CFF}"/>
+              </a:ext>
+            </a:extLst>
+          </p:cNvPr>
+          <p:cNvSpPr txBox="1"/>
+          <p:nvPr/>
+        </p:nvSpPr>
+        <p:spPr>
+          <a:xfrm>
+            <a:off x="3639052" y="5745366"/>
+            <a:ext cx="2372728" cy="2031325"/>
+          </a:xfrm>
+          <a:prstGeom prst="rect">
+            <a:avLst/>
+          </a:prstGeom>
+          <a:noFill/>
+        </p:spPr>
+        <p:txBody>
+          <a:bodyPr wrap="square" rtlCol="0">
+            <a:spAutoFit/>
+          </a:bodyPr>
+          <a:lstStyle/>
+          <a:p>
+            <a:r>
+              <a:rPr lang="en-US" b="1" dirty="0">
+                <a:latin typeface="Times New Roman" panose="02020603050405020304" pitchFamily="18" charset="0"/>
+                <a:cs typeface="Times New Roman" panose="02020603050405020304" pitchFamily="18" charset="0"/>
+              </a:rPr>
+              <a:t>Red Slime</a:t>
+            </a:r>
+            <a:r>
+              <a:rPr lang="en-US" dirty="0">
+                <a:latin typeface="Times New Roman" panose="02020603050405020304" pitchFamily="18" charset="0"/>
+                <a:cs typeface="Times New Roman" panose="02020603050405020304" pitchFamily="18" charset="0"/>
+              </a:rPr>
+              <a:t>: a rare variant of the slime these fellows are quite similar but upon death they explode into projectiles.</a:t>
+            </a:r>
+          </a:p>
+          <a:p>
+            <a:endParaRPr lang="en-US" dirty="0">
+              <a:latin typeface="Times New Roman" panose="02020603050405020304" pitchFamily="18" charset="0"/>
+              <a:cs typeface="Times New Roman" panose="02020603050405020304" pitchFamily="18" charset="0"/>
+            </a:endParaRPr>
+          </a:p>
+        </p:txBody>
+      </p:sp>
+      <p:pic>
+        <p:nvPicPr>
+          <p:cNvPr id="10" name="Picture 9" descr="A picture containing text, toy, clipart, vector graphics&#10;&#10;Description automatically generated">
+            <a:extLst>
+              <a:ext uri="{FF2B5EF4-FFF2-40B4-BE49-F238E27FC236}">
+                <a16:creationId xmlns:a16="http://schemas.microsoft.com/office/drawing/2014/main" id="{E29E3449-674A-F156-8FC3-ECEE0577BD29}"/>
+              </a:ext>
+            </a:extLst>
+          </p:cNvPr>
+          <p:cNvPicPr>
+            <a:picLocks noChangeAspect="1"/>
+          </p:cNvPicPr>
+          <p:nvPr/>
+        </p:nvPicPr>
+        <p:blipFill>
+          <a:blip r:embed="rId2">
+            <a:extLst>
+              <a:ext uri="{28A0092B-C50C-407E-A947-70E740481C1C}">
+                <a14:useLocalDpi xmlns:a14="http://schemas.microsoft.com/office/drawing/2010/main" val="0"/>
+              </a:ext>
+            </a:extLst>
+          </a:blip>
+          <a:stretch>
+            <a:fillRect/>
+          </a:stretch>
+        </p:blipFill>
+        <p:spPr>
+          <a:xfrm>
+            <a:off x="1318587" y="2525127"/>
+            <a:ext cx="914400" cy="1143000"/>
+          </a:xfrm>
+          <a:prstGeom prst="rect">
+            <a:avLst/>
+          </a:prstGeom>
+        </p:spPr>
+      </p:pic>
+      <p:pic>
+        <p:nvPicPr>
+          <p:cNvPr id="13" name="Picture 12" descr="Chart&#10;&#10;Description automatically generated">
+            <a:extLst>
+              <a:ext uri="{FF2B5EF4-FFF2-40B4-BE49-F238E27FC236}">
+                <a16:creationId xmlns:a16="http://schemas.microsoft.com/office/drawing/2014/main" id="{06CD1371-2C57-DF01-B70E-C19E965ADC6E}"/>
+              </a:ext>
+            </a:extLst>
+          </p:cNvPr>
+          <p:cNvPicPr>
+            <a:picLocks noChangeAspect="1"/>
+          </p:cNvPicPr>
+          <p:nvPr/>
+        </p:nvPicPr>
+        <p:blipFill>
+          <a:blip r:embed="rId3">
+            <a:extLst>
+              <a:ext uri="{28A0092B-C50C-407E-A947-70E740481C1C}">
+                <a14:useLocalDpi xmlns:a14="http://schemas.microsoft.com/office/drawing/2010/main" val="0"/>
+              </a:ext>
+            </a:extLst>
+          </a:blip>
+          <a:stretch>
+            <a:fillRect/>
+          </a:stretch>
+        </p:blipFill>
+        <p:spPr>
+          <a:xfrm>
+            <a:off x="4184107" y="2491739"/>
+            <a:ext cx="933324" cy="1136221"/>
+          </a:xfrm>
+          <a:prstGeom prst="rect">
+            <a:avLst/>
+          </a:prstGeom>
+        </p:spPr>
+      </p:pic>
+      <p:pic>
+        <p:nvPicPr>
+          <p:cNvPr id="17" name="Picture 16" descr="Chart&#10;&#10;Description automatically generated">
+            <a:extLst>
+              <a:ext uri="{FF2B5EF4-FFF2-40B4-BE49-F238E27FC236}">
+                <a16:creationId xmlns:a16="http://schemas.microsoft.com/office/drawing/2014/main" id="{BB441908-CC61-44A2-E639-03363648BB19}"/>
+              </a:ext>
+            </a:extLst>
+          </p:cNvPr>
+          <p:cNvPicPr>
+            <a:picLocks noChangeAspect="1"/>
+          </p:cNvPicPr>
+          <p:nvPr/>
+        </p:nvPicPr>
+        <p:blipFill>
+          <a:blip r:embed="rId4">
+            <a:extLst>
+              <a:ext uri="{28A0092B-C50C-407E-A947-70E740481C1C}">
+                <a14:useLocalDpi xmlns:a14="http://schemas.microsoft.com/office/drawing/2010/main" val="0"/>
+              </a:ext>
+            </a:extLst>
+          </a:blip>
+          <a:stretch>
+            <a:fillRect/>
+          </a:stretch>
+        </p:blipFill>
+        <p:spPr>
+          <a:xfrm>
+            <a:off x="1244645" y="6455322"/>
+            <a:ext cx="1470861" cy="1790613"/>
+          </a:xfrm>
+          <a:prstGeom prst="rect">
+            <a:avLst/>
+          </a:prstGeom>
+        </p:spPr>
+      </p:pic>
+      <p:sp>
+        <p:nvSpPr>
           <p:cNvPr id="2" name="Title 1">
             <a:extLst>
               <a:ext uri="{FF2B5EF4-FFF2-40B4-BE49-F238E27FC236}">
@@ -4336,71 +4916,24 @@
             <p:ph type="title"/>
           </p:nvPr>
         </p:nvSpPr>
-        <p:spPr/>
-        <p:txBody>
-          <a:bodyPr/>
-          <a:lstStyle/>
-          <a:p>
-            <a:r>
-              <a:rPr lang="en-US" dirty="0"/>
-              <a:t>The foes</a:t>
-            </a:r>
-          </a:p>
-        </p:txBody>
-      </p:sp>
-      <p:sp>
-        <p:nvSpPr>
-          <p:cNvPr id="3" name="Content Placeholder 2">
-            <a:extLst>
-              <a:ext uri="{FF2B5EF4-FFF2-40B4-BE49-F238E27FC236}">
-                <a16:creationId xmlns:a16="http://schemas.microsoft.com/office/drawing/2014/main" id="{D63B7DD1-913C-4A56-BB2D-70F5ABE249F8}"/>
-              </a:ext>
-            </a:extLst>
-          </p:cNvPr>
-          <p:cNvSpPr>
-            <a:spLocks noGrp="1"/>
-          </p:cNvSpPr>
-          <p:nvPr>
-            <p:ph idx="1"/>
-          </p:nvPr>
-        </p:nvSpPr>
-        <p:spPr>
-          <a:xfrm>
-            <a:off x="471487" y="1942070"/>
-            <a:ext cx="5915025" cy="6285266"/>
-          </a:xfrm>
-        </p:spPr>
-        <p:txBody>
-          <a:bodyPr/>
-          <a:lstStyle/>
-          <a:p>
-            <a:r>
-              <a:rPr lang="en-US" dirty="0"/>
-              <a:t>Goblin: Honestly, these guys are really friendly but panic far too easily after they start panicking, they fire rocks out of their mouth. Be careful, while Craig can cut down these rocks, goblins can fire faster than he can swing.</a:t>
-            </a:r>
-          </a:p>
-          <a:p>
-            <a:r>
-              <a:rPr lang="en-US" dirty="0"/>
-              <a:t>Slime: they’re really attention starved a complete 180 from goblin they will run at you relentlessly until killed.</a:t>
-            </a:r>
-          </a:p>
-          <a:p>
-            <a:r>
-              <a:rPr lang="en-US" dirty="0"/>
-              <a:t>Red Slime: a rare variant of the slime these fellows are quite similar but upon death they explode into projectiles.</a:t>
-            </a:r>
-          </a:p>
-          <a:p>
-            <a:r>
-              <a:rPr lang="en-US" dirty="0"/>
-              <a:t>Skeleton: a creature most unloved. God may have given them 206 bones, but they never can make use of them all.</a:t>
-            </a:r>
-          </a:p>
-          <a:p>
-            <a:r>
-              <a:rPr lang="en-US" dirty="0"/>
-              <a:t>Wizard: they formerly held positions of great power. The one Foe to not have lost their mind, although their minds have been corrupted by The Witch. Able to spawn an explosion below the player, these dastardly dudes disappear from one destination to another.</a:t>
+        <p:spPr>
+          <a:xfrm>
+            <a:off x="320403" y="587202"/>
+            <a:ext cx="2910765" cy="832360"/>
+          </a:xfrm>
+        </p:spPr>
+        <p:txBody>
+          <a:bodyPr>
+            <a:noAutofit/>
+          </a:bodyPr>
+          <a:lstStyle/>
+          <a:p>
+            <a:r>
+              <a:rPr lang="en-US" sz="4800" dirty="0">
+                <a:latin typeface="Times New Roman" panose="02020603050405020304" pitchFamily="18" charset="0"/>
+                <a:cs typeface="Times New Roman" panose="02020603050405020304" pitchFamily="18" charset="0"/>
+              </a:rPr>
+              <a:t>The Foes</a:t>
             </a:r>
           </a:p>
         </p:txBody>
@@ -4437,50 +4970,401 @@
       </p:grpSpPr>
       <p:sp>
         <p:nvSpPr>
-          <p:cNvPr id="2" name="Title 1">
-            <a:extLst>
-              <a:ext uri="{FF2B5EF4-FFF2-40B4-BE49-F238E27FC236}">
-                <a16:creationId xmlns:a16="http://schemas.microsoft.com/office/drawing/2014/main" id="{A445509E-53D1-49BF-2EA2-2E9CE25A6047}"/>
-              </a:ext>
-            </a:extLst>
-          </p:cNvPr>
-          <p:cNvSpPr>
-            <a:spLocks noGrp="1"/>
-          </p:cNvSpPr>
-          <p:nvPr>
-            <p:ph type="title"/>
-          </p:nvPr>
-        </p:nvSpPr>
-        <p:spPr/>
-        <p:txBody>
-          <a:bodyPr/>
-          <a:lstStyle/>
-          <a:p>
+          <p:cNvPr id="17" name="Rectangle 16">
+            <a:extLst>
+              <a:ext uri="{FF2B5EF4-FFF2-40B4-BE49-F238E27FC236}">
+                <a16:creationId xmlns:a16="http://schemas.microsoft.com/office/drawing/2014/main" id="{0FEFF97D-20A2-7B29-4626-032023A972DB}"/>
+              </a:ext>
+            </a:extLst>
+          </p:cNvPr>
+          <p:cNvSpPr/>
+          <p:nvPr/>
+        </p:nvSpPr>
+        <p:spPr>
+          <a:xfrm>
+            <a:off x="3429000" y="-1162050"/>
+            <a:ext cx="3463458" cy="11068050"/>
+          </a:xfrm>
+          <a:prstGeom prst="rect">
+            <a:avLst/>
+          </a:prstGeom>
+          <a:ln>
+            <a:noFill/>
+          </a:ln>
+        </p:spPr>
+        <p:style>
+          <a:lnRef idx="2">
+            <a:schemeClr val="accent3">
+              <a:shade val="50000"/>
+            </a:schemeClr>
+          </a:lnRef>
+          <a:fillRef idx="1">
+            <a:schemeClr val="accent3"/>
+          </a:fillRef>
+          <a:effectRef idx="0">
+            <a:schemeClr val="accent3"/>
+          </a:effectRef>
+          <a:fontRef idx="minor">
+            <a:schemeClr val="lt1"/>
+          </a:fontRef>
+        </p:style>
+        <p:txBody>
+          <a:bodyPr rtlCol="0" anchor="ctr"/>
+          <a:lstStyle/>
+          <a:p>
+            <a:pPr algn="ctr"/>
             <a:endParaRPr lang="en-US"/>
           </a:p>
         </p:txBody>
       </p:sp>
       <p:sp>
         <p:nvSpPr>
-          <p:cNvPr id="3" name="Content Placeholder 2">
-            <a:extLst>
-              <a:ext uri="{FF2B5EF4-FFF2-40B4-BE49-F238E27FC236}">
-                <a16:creationId xmlns:a16="http://schemas.microsoft.com/office/drawing/2014/main" id="{119C4017-3C05-1D62-B04E-5BD7A8F6FC34}"/>
-              </a:ext>
-            </a:extLst>
-          </p:cNvPr>
-          <p:cNvSpPr>
-            <a:spLocks noGrp="1"/>
-          </p:cNvSpPr>
-          <p:nvPr>
-            <p:ph idx="1"/>
-          </p:nvPr>
-        </p:nvSpPr>
-        <p:spPr/>
-        <p:txBody>
-          <a:bodyPr/>
-          <a:lstStyle/>
-          <a:p>
+          <p:cNvPr id="10" name="Rectangle 9">
+            <a:extLst>
+              <a:ext uri="{FF2B5EF4-FFF2-40B4-BE49-F238E27FC236}">
+                <a16:creationId xmlns:a16="http://schemas.microsoft.com/office/drawing/2014/main" id="{FD6E9BA6-DBB1-1E1D-BBD7-AC9EE4686AD0}"/>
+              </a:ext>
+            </a:extLst>
+          </p:cNvPr>
+          <p:cNvSpPr/>
+          <p:nvPr/>
+        </p:nvSpPr>
+        <p:spPr>
+          <a:xfrm>
+            <a:off x="17796" y="1195868"/>
+            <a:ext cx="5367836" cy="1445523"/>
+          </a:xfrm>
+          <a:prstGeom prst="rect">
+            <a:avLst/>
+          </a:prstGeom>
+          <a:ln>
+            <a:noFill/>
+          </a:ln>
+        </p:spPr>
+        <p:style>
+          <a:lnRef idx="1">
+            <a:schemeClr val="accent3"/>
+          </a:lnRef>
+          <a:fillRef idx="2">
+            <a:schemeClr val="accent3"/>
+          </a:fillRef>
+          <a:effectRef idx="1">
+            <a:schemeClr val="accent3"/>
+          </a:effectRef>
+          <a:fontRef idx="minor">
+            <a:schemeClr val="dk1"/>
+          </a:fontRef>
+        </p:style>
+        <p:txBody>
+          <a:bodyPr rtlCol="0" anchor="ctr"/>
+          <a:lstStyle/>
+          <a:p>
+            <a:pPr algn="ctr"/>
+            <a:endParaRPr lang="en-US"/>
+          </a:p>
+        </p:txBody>
+      </p:sp>
+      <p:sp>
+        <p:nvSpPr>
+          <p:cNvPr id="4" name="TextBox 3">
+            <a:extLst>
+              <a:ext uri="{FF2B5EF4-FFF2-40B4-BE49-F238E27FC236}">
+                <a16:creationId xmlns:a16="http://schemas.microsoft.com/office/drawing/2014/main" id="{A60CB3BF-07CE-3E81-F126-F62DB0A04A49}"/>
+              </a:ext>
+            </a:extLst>
+          </p:cNvPr>
+          <p:cNvSpPr txBox="1"/>
+          <p:nvPr/>
+        </p:nvSpPr>
+        <p:spPr>
+          <a:xfrm>
+            <a:off x="0" y="1453386"/>
+            <a:ext cx="5550568" cy="923330"/>
+          </a:xfrm>
+          <a:prstGeom prst="rect">
+            <a:avLst/>
+          </a:prstGeom>
+          <a:noFill/>
+        </p:spPr>
+        <p:txBody>
+          <a:bodyPr wrap="square" rtlCol="0">
+            <a:spAutoFit/>
+          </a:bodyPr>
+          <a:lstStyle/>
+          <a:p>
+            <a:r>
+              <a:rPr lang="en-US" b="1" dirty="0">
+                <a:latin typeface="Times New Roman" panose="02020603050405020304" pitchFamily="18" charset="0"/>
+                <a:cs typeface="Times New Roman" panose="02020603050405020304" pitchFamily="18" charset="0"/>
+              </a:rPr>
+              <a:t>Skeleton</a:t>
+            </a:r>
+            <a:r>
+              <a:rPr lang="en-US" dirty="0">
+                <a:latin typeface="Times New Roman" panose="02020603050405020304" pitchFamily="18" charset="0"/>
+                <a:cs typeface="Times New Roman" panose="02020603050405020304" pitchFamily="18" charset="0"/>
+              </a:rPr>
+              <a:t>: a creature most unloved. God may have given them 206 bones, but they never can make use of them all.</a:t>
+            </a:r>
+          </a:p>
+          <a:p>
+            <a:endParaRPr lang="en-US" dirty="0">
+              <a:latin typeface="Times New Roman" panose="02020603050405020304" pitchFamily="18" charset="0"/>
+              <a:cs typeface="Times New Roman" panose="02020603050405020304" pitchFamily="18" charset="0"/>
+            </a:endParaRPr>
+          </a:p>
+        </p:txBody>
+      </p:sp>
+      <p:sp>
+        <p:nvSpPr>
+          <p:cNvPr id="11" name="Rectangle 10">
+            <a:extLst>
+              <a:ext uri="{FF2B5EF4-FFF2-40B4-BE49-F238E27FC236}">
+                <a16:creationId xmlns:a16="http://schemas.microsoft.com/office/drawing/2014/main" id="{3A9D3BB0-1459-159F-1889-192EAE292403}"/>
+              </a:ext>
+            </a:extLst>
+          </p:cNvPr>
+          <p:cNvSpPr/>
+          <p:nvPr/>
+        </p:nvSpPr>
+        <p:spPr>
+          <a:xfrm>
+            <a:off x="278478" y="6062798"/>
+            <a:ext cx="5550568" cy="1445524"/>
+          </a:xfrm>
+          <a:prstGeom prst="rect">
+            <a:avLst/>
+          </a:prstGeom>
+          <a:ln>
+            <a:noFill/>
+          </a:ln>
+        </p:spPr>
+        <p:style>
+          <a:lnRef idx="1">
+            <a:schemeClr val="accent3"/>
+          </a:lnRef>
+          <a:fillRef idx="2">
+            <a:schemeClr val="accent3"/>
+          </a:fillRef>
+          <a:effectRef idx="1">
+            <a:schemeClr val="accent3"/>
+          </a:effectRef>
+          <a:fontRef idx="minor">
+            <a:schemeClr val="dk1"/>
+          </a:fontRef>
+        </p:style>
+        <p:txBody>
+          <a:bodyPr rtlCol="0" anchor="ctr"/>
+          <a:lstStyle/>
+          <a:p>
+            <a:pPr algn="ctr"/>
+            <a:endParaRPr lang="en-US"/>
+          </a:p>
+        </p:txBody>
+      </p:sp>
+      <p:sp>
+        <p:nvSpPr>
+          <p:cNvPr id="5" name="TextBox 4">
+            <a:extLst>
+              <a:ext uri="{FF2B5EF4-FFF2-40B4-BE49-F238E27FC236}">
+                <a16:creationId xmlns:a16="http://schemas.microsoft.com/office/drawing/2014/main" id="{6D286A8F-27B0-153A-176C-3E433937853D}"/>
+              </a:ext>
+            </a:extLst>
+          </p:cNvPr>
+          <p:cNvSpPr txBox="1"/>
+          <p:nvPr/>
+        </p:nvSpPr>
+        <p:spPr>
+          <a:xfrm>
+            <a:off x="278478" y="6062798"/>
+            <a:ext cx="5550568" cy="1754326"/>
+          </a:xfrm>
+          <a:prstGeom prst="rect">
+            <a:avLst/>
+          </a:prstGeom>
+          <a:noFill/>
+        </p:spPr>
+        <p:txBody>
+          <a:bodyPr wrap="square" rtlCol="0">
+            <a:spAutoFit/>
+          </a:bodyPr>
+          <a:lstStyle/>
+          <a:p>
+            <a:r>
+              <a:rPr lang="en-US" b="1" dirty="0">
+                <a:latin typeface="Times New Roman" panose="02020603050405020304" pitchFamily="18" charset="0"/>
+                <a:cs typeface="Times New Roman" panose="02020603050405020304" pitchFamily="18" charset="0"/>
+              </a:rPr>
+              <a:t>Wizard</a:t>
+            </a:r>
+            <a:r>
+              <a:rPr lang="en-US" dirty="0">
+                <a:latin typeface="Times New Roman" panose="02020603050405020304" pitchFamily="18" charset="0"/>
+                <a:cs typeface="Times New Roman" panose="02020603050405020304" pitchFamily="18" charset="0"/>
+              </a:rPr>
+              <a:t>: they formerly held positions of great power. The one Foe to not have lost their mind, although their minds have been corrupted by The Witch. Able to spawn an explosion below the player, these dastardly dudes disappear from one destination to another.</a:t>
+            </a:r>
+          </a:p>
+          <a:p>
+            <a:endParaRPr lang="en-US" dirty="0">
+              <a:latin typeface="Times New Roman" panose="02020603050405020304" pitchFamily="18" charset="0"/>
+              <a:cs typeface="Times New Roman" panose="02020603050405020304" pitchFamily="18" charset="0"/>
+            </a:endParaRPr>
+          </a:p>
+        </p:txBody>
+      </p:sp>
+      <p:pic>
+        <p:nvPicPr>
+          <p:cNvPr id="7" name="Picture 6" descr="Chart, histogram&#10;&#10;Description automatically generated">
+            <a:extLst>
+              <a:ext uri="{FF2B5EF4-FFF2-40B4-BE49-F238E27FC236}">
+                <a16:creationId xmlns:a16="http://schemas.microsoft.com/office/drawing/2014/main" id="{A9A4F407-00A7-3F0D-A8AB-BB7DB98A2192}"/>
+              </a:ext>
+            </a:extLst>
+          </p:cNvPr>
+          <p:cNvPicPr>
+            <a:picLocks noChangeAspect="1"/>
+          </p:cNvPicPr>
+          <p:nvPr/>
+        </p:nvPicPr>
+        <p:blipFill>
+          <a:blip r:embed="rId2">
+            <a:extLst>
+              <a:ext uri="{28A0092B-C50C-407E-A947-70E740481C1C}">
+                <a14:useLocalDpi xmlns:a14="http://schemas.microsoft.com/office/drawing/2010/main" val="0"/>
+              </a:ext>
+            </a:extLst>
+          </a:blip>
+          <a:stretch>
+            <a:fillRect/>
+          </a:stretch>
+        </p:blipFill>
+        <p:spPr>
+          <a:xfrm>
+            <a:off x="17796" y="4263701"/>
+            <a:ext cx="1279358" cy="1799097"/>
+          </a:xfrm>
+          <a:prstGeom prst="rect">
+            <a:avLst/>
+          </a:prstGeom>
+        </p:spPr>
+      </p:pic>
+      <p:pic>
+        <p:nvPicPr>
+          <p:cNvPr id="9" name="Picture 8" descr="A picture containing text, clipart&#10;&#10;Description automatically generated">
+            <a:extLst>
+              <a:ext uri="{FF2B5EF4-FFF2-40B4-BE49-F238E27FC236}">
+                <a16:creationId xmlns:a16="http://schemas.microsoft.com/office/drawing/2014/main" id="{9515F116-951C-E911-4ADF-937F577DAA93}"/>
+              </a:ext>
+            </a:extLst>
+          </p:cNvPr>
+          <p:cNvPicPr>
+            <a:picLocks noChangeAspect="1"/>
+          </p:cNvPicPr>
+          <p:nvPr/>
+        </p:nvPicPr>
+        <p:blipFill>
+          <a:blip r:embed="rId3">
+            <a:extLst>
+              <a:ext uri="{28A0092B-C50C-407E-A947-70E740481C1C}">
+                <a14:useLocalDpi xmlns:a14="http://schemas.microsoft.com/office/drawing/2010/main" val="0"/>
+              </a:ext>
+            </a:extLst>
+          </a:blip>
+          <a:stretch>
+            <a:fillRect/>
+          </a:stretch>
+        </p:blipFill>
+        <p:spPr>
+          <a:xfrm>
+            <a:off x="5385632" y="1076361"/>
+            <a:ext cx="1359569" cy="1954380"/>
+          </a:xfrm>
+          <a:prstGeom prst="rect">
+            <a:avLst/>
+          </a:prstGeom>
+        </p:spPr>
+      </p:pic>
+      <p:pic>
+        <p:nvPicPr>
+          <p:cNvPr id="16" name="Picture 15" descr="Chart, histogram&#10;&#10;Description automatically generated">
+            <a:extLst>
+              <a:ext uri="{FF2B5EF4-FFF2-40B4-BE49-F238E27FC236}">
+                <a16:creationId xmlns:a16="http://schemas.microsoft.com/office/drawing/2014/main" id="{4E68475B-AD9F-6939-B5DA-C20173523644}"/>
+              </a:ext>
+            </a:extLst>
+          </p:cNvPr>
+          <p:cNvPicPr>
+            <a:picLocks noChangeAspect="1"/>
+          </p:cNvPicPr>
+          <p:nvPr/>
+        </p:nvPicPr>
+        <p:blipFill>
+          <a:blip r:embed="rId2">
+            <a:extLst>
+              <a:ext uri="{28A0092B-C50C-407E-A947-70E740481C1C}">
+                <a14:useLocalDpi xmlns:a14="http://schemas.microsoft.com/office/drawing/2010/main" val="0"/>
+              </a:ext>
+            </a:extLst>
+          </a:blip>
+          <a:stretch>
+            <a:fillRect/>
+          </a:stretch>
+        </p:blipFill>
+        <p:spPr>
+          <a:xfrm flipH="1">
+            <a:off x="4810370" y="4263701"/>
+            <a:ext cx="1279358" cy="1799097"/>
+          </a:xfrm>
+          <a:prstGeom prst="rect">
+            <a:avLst/>
+          </a:prstGeom>
+        </p:spPr>
+      </p:pic>
+      <p:sp>
+        <p:nvSpPr>
+          <p:cNvPr id="18" name="Rectangle: Rounded Corners 17">
+            <a:extLst>
+              <a:ext uri="{FF2B5EF4-FFF2-40B4-BE49-F238E27FC236}">
+                <a16:creationId xmlns:a16="http://schemas.microsoft.com/office/drawing/2014/main" id="{96DEAE3E-CC9C-BED7-2680-E915FE7B0816}"/>
+              </a:ext>
+            </a:extLst>
+          </p:cNvPr>
+          <p:cNvSpPr/>
+          <p:nvPr/>
+        </p:nvSpPr>
+        <p:spPr>
+          <a:xfrm>
+            <a:off x="2509942" y="7685108"/>
+            <a:ext cx="6081251" cy="1393371"/>
+          </a:xfrm>
+          <a:prstGeom prst="roundRect">
+            <a:avLst>
+              <a:gd name="adj" fmla="val 50000"/>
+            </a:avLst>
+          </a:prstGeom>
+        </p:spPr>
+        <p:style>
+          <a:lnRef idx="2">
+            <a:schemeClr val="accent1">
+              <a:shade val="50000"/>
+            </a:schemeClr>
+          </a:lnRef>
+          <a:fillRef idx="1">
+            <a:schemeClr val="accent1"/>
+          </a:fillRef>
+          <a:effectRef idx="0">
+            <a:schemeClr val="accent1"/>
+          </a:effectRef>
+          <a:fontRef idx="minor">
+            <a:schemeClr val="lt1"/>
+          </a:fontRef>
+        </p:style>
+        <p:txBody>
+          <a:bodyPr rtlCol="0" anchor="ctr"/>
+          <a:lstStyle/>
+          <a:p>
+            <a:pPr algn="ctr"/>
             <a:endParaRPr lang="en-US"/>
           </a:p>
         </p:txBody>
@@ -4515,84 +5399,12 @@
           <a:chExt cx="0" cy="0"/>
         </a:xfrm>
       </p:grpSpPr>
-      <p:pic>
-        <p:nvPicPr>
-          <p:cNvPr id="70" name="Picture 69" descr="A picture containing text&#10;&#10;Description automatically generated">
-            <a:extLst>
-              <a:ext uri="{FF2B5EF4-FFF2-40B4-BE49-F238E27FC236}">
-                <a16:creationId xmlns:a16="http://schemas.microsoft.com/office/drawing/2014/main" id="{5627B069-4CF3-8894-0AF3-0CF21F59E850}"/>
-              </a:ext>
-            </a:extLst>
-          </p:cNvPr>
-          <p:cNvPicPr>
-            <a:picLocks noChangeAspect="1"/>
-          </p:cNvPicPr>
-          <p:nvPr/>
-        </p:nvPicPr>
-        <p:blipFill>
-          <a:blip r:embed="rId2">
-            <a:extLst>
-              <a:ext uri="{28A0092B-C50C-407E-A947-70E740481C1C}">
-                <a14:useLocalDpi xmlns:a14="http://schemas.microsoft.com/office/drawing/2010/main" val="0"/>
-              </a:ext>
-            </a:extLst>
-          </a:blip>
-          <a:stretch>
-            <a:fillRect/>
-          </a:stretch>
-        </p:blipFill>
-        <p:spPr>
-          <a:xfrm>
-            <a:off x="353071" y="3421366"/>
-            <a:ext cx="1085850" cy="1114425"/>
-          </a:xfrm>
-          <a:prstGeom prst="rect">
-            <a:avLst/>
-          </a:prstGeom>
-        </p:spPr>
-      </p:pic>
-      <p:pic>
-        <p:nvPicPr>
-          <p:cNvPr id="68" name="Picture 67" descr="Chart, histogram&#10;&#10;Description automatically generated">
-            <a:extLst>
-              <a:ext uri="{FF2B5EF4-FFF2-40B4-BE49-F238E27FC236}">
-                <a16:creationId xmlns:a16="http://schemas.microsoft.com/office/drawing/2014/main" id="{A6661141-28DD-99B5-C6CD-492AF21F34FC}"/>
-              </a:ext>
-            </a:extLst>
-          </p:cNvPr>
-          <p:cNvPicPr>
-            <a:picLocks noChangeAspect="1"/>
-          </p:cNvPicPr>
-          <p:nvPr/>
-        </p:nvPicPr>
-        <p:blipFill>
-          <a:blip r:embed="rId3">
-            <a:extLst>
-              <a:ext uri="{28A0092B-C50C-407E-A947-70E740481C1C}">
-                <a14:useLocalDpi xmlns:a14="http://schemas.microsoft.com/office/drawing/2010/main" val="0"/>
-              </a:ext>
-            </a:extLst>
-          </a:blip>
-          <a:stretch>
-            <a:fillRect/>
-          </a:stretch>
-        </p:blipFill>
-        <p:spPr>
-          <a:xfrm>
-            <a:off x="438796" y="4841128"/>
-            <a:ext cx="914400" cy="1114425"/>
-          </a:xfrm>
-          <a:prstGeom prst="rect">
-            <a:avLst/>
-          </a:prstGeom>
-        </p:spPr>
-      </p:pic>
-      <p:sp>
-        <p:nvSpPr>
-          <p:cNvPr id="42" name="Arrow: Down 41">
-            <a:extLst>
-              <a:ext uri="{FF2B5EF4-FFF2-40B4-BE49-F238E27FC236}">
-                <a16:creationId xmlns:a16="http://schemas.microsoft.com/office/drawing/2014/main" id="{E99080F4-7341-77B6-63D3-186982F57B76}"/>
+      <p:sp>
+        <p:nvSpPr>
+          <p:cNvPr id="11" name="Rectangle: Rounded Corners 10">
+            <a:extLst>
+              <a:ext uri="{FF2B5EF4-FFF2-40B4-BE49-F238E27FC236}">
+                <a16:creationId xmlns:a16="http://schemas.microsoft.com/office/drawing/2014/main" id="{C22F1D47-7437-9FE9-0D09-AED17024EB4C}"/>
               </a:ext>
             </a:extLst>
           </p:cNvPr>
@@ -4600,16 +5412,254 @@
           <p:nvPr/>
         </p:nvSpPr>
         <p:spPr>
-          <a:xfrm rot="10800000">
-            <a:off x="2998554" y="1533227"/>
-            <a:ext cx="886649" cy="1636199"/>
-          </a:xfrm>
-          <a:prstGeom prst="downArrow">
-            <a:avLst/>
+          <a:xfrm>
+            <a:off x="4360515" y="6560541"/>
+            <a:ext cx="2144413" cy="465338"/>
+          </a:xfrm>
+          <a:prstGeom prst="roundRect">
+            <a:avLst>
+              <a:gd name="adj" fmla="val 50000"/>
+            </a:avLst>
+          </a:prstGeom>
+        </p:spPr>
+        <p:style>
+          <a:lnRef idx="1">
+            <a:schemeClr val="accent1"/>
+          </a:lnRef>
+          <a:fillRef idx="3">
+            <a:schemeClr val="accent1"/>
+          </a:fillRef>
+          <a:effectRef idx="2">
+            <a:schemeClr val="accent1"/>
+          </a:effectRef>
+          <a:fontRef idx="minor">
+            <a:schemeClr val="lt1"/>
+          </a:fontRef>
+        </p:style>
+        <p:txBody>
+          <a:bodyPr rtlCol="0" anchor="ctr"/>
+          <a:lstStyle/>
+          <a:p>
+            <a:pPr algn="ctr"/>
+            <a:endParaRPr lang="en-US"/>
+          </a:p>
+        </p:txBody>
+      </p:sp>
+      <p:sp>
+        <p:nvSpPr>
+          <p:cNvPr id="9" name="Rectangle: Rounded Corners 8">
+            <a:extLst>
+              <a:ext uri="{FF2B5EF4-FFF2-40B4-BE49-F238E27FC236}">
+                <a16:creationId xmlns:a16="http://schemas.microsoft.com/office/drawing/2014/main" id="{E2922750-E1AE-4556-B24F-BC2FB2326551}"/>
+              </a:ext>
+            </a:extLst>
+          </p:cNvPr>
+          <p:cNvSpPr/>
+          <p:nvPr/>
+        </p:nvSpPr>
+        <p:spPr>
+          <a:xfrm>
+            <a:off x="4360516" y="6023262"/>
+            <a:ext cx="2144413" cy="465338"/>
+          </a:xfrm>
+          <a:prstGeom prst="roundRect">
+            <a:avLst>
+              <a:gd name="adj" fmla="val 50000"/>
+            </a:avLst>
+          </a:prstGeom>
+        </p:spPr>
+        <p:style>
+          <a:lnRef idx="1">
+            <a:schemeClr val="accent1"/>
+          </a:lnRef>
+          <a:fillRef idx="3">
+            <a:schemeClr val="accent1"/>
+          </a:fillRef>
+          <a:effectRef idx="2">
+            <a:schemeClr val="accent1"/>
+          </a:effectRef>
+          <a:fontRef idx="minor">
+            <a:schemeClr val="lt1"/>
+          </a:fontRef>
+        </p:style>
+        <p:txBody>
+          <a:bodyPr rtlCol="0" anchor="ctr"/>
+          <a:lstStyle/>
+          <a:p>
+            <a:pPr algn="ctr"/>
+            <a:endParaRPr lang="en-US"/>
+          </a:p>
+        </p:txBody>
+      </p:sp>
+      <p:sp>
+        <p:nvSpPr>
+          <p:cNvPr id="6" name="Rectangle: Rounded Corners 5">
+            <a:extLst>
+              <a:ext uri="{FF2B5EF4-FFF2-40B4-BE49-F238E27FC236}">
+                <a16:creationId xmlns:a16="http://schemas.microsoft.com/office/drawing/2014/main" id="{880C2FF5-9A88-FCE9-A7E5-F2D8041A9ABE}"/>
+              </a:ext>
+            </a:extLst>
+          </p:cNvPr>
+          <p:cNvSpPr/>
+          <p:nvPr/>
+        </p:nvSpPr>
+        <p:spPr>
+          <a:xfrm>
+            <a:off x="-1562098" y="3468503"/>
+            <a:ext cx="4843773" cy="1054034"/>
+          </a:xfrm>
+          <a:prstGeom prst="roundRect">
+            <a:avLst>
+              <a:gd name="adj" fmla="val 50000"/>
+            </a:avLst>
           </a:prstGeom>
           <a:ln>
             <a:noFill/>
           </a:ln>
+        </p:spPr>
+        <p:style>
+          <a:lnRef idx="0">
+            <a:schemeClr val="accent1"/>
+          </a:lnRef>
+          <a:fillRef idx="3">
+            <a:schemeClr val="accent1"/>
+          </a:fillRef>
+          <a:effectRef idx="3">
+            <a:schemeClr val="accent1"/>
+          </a:effectRef>
+          <a:fontRef idx="minor">
+            <a:schemeClr val="lt1"/>
+          </a:fontRef>
+        </p:style>
+        <p:txBody>
+          <a:bodyPr rtlCol="0" anchor="ctr"/>
+          <a:lstStyle/>
+          <a:p>
+            <a:pPr algn="ctr"/>
+            <a:endParaRPr lang="en-US"/>
+          </a:p>
+        </p:txBody>
+      </p:sp>
+      <p:sp>
+        <p:nvSpPr>
+          <p:cNvPr id="7" name="Rectangle: Rounded Corners 6">
+            <a:extLst>
+              <a:ext uri="{FF2B5EF4-FFF2-40B4-BE49-F238E27FC236}">
+                <a16:creationId xmlns:a16="http://schemas.microsoft.com/office/drawing/2014/main" id="{34674042-0934-E9B2-813C-15FA8F05E662}"/>
+              </a:ext>
+            </a:extLst>
+          </p:cNvPr>
+          <p:cNvSpPr/>
+          <p:nvPr/>
+        </p:nvSpPr>
+        <p:spPr>
+          <a:xfrm>
+            <a:off x="-1376671" y="4821613"/>
+            <a:ext cx="5004860" cy="1114426"/>
+          </a:xfrm>
+          <a:prstGeom prst="roundRect">
+            <a:avLst>
+              <a:gd name="adj" fmla="val 50000"/>
+            </a:avLst>
+          </a:prstGeom>
+          <a:ln>
+            <a:noFill/>
+          </a:ln>
+        </p:spPr>
+        <p:style>
+          <a:lnRef idx="0">
+            <a:schemeClr val="accent1"/>
+          </a:lnRef>
+          <a:fillRef idx="3">
+            <a:schemeClr val="accent1"/>
+          </a:fillRef>
+          <a:effectRef idx="3">
+            <a:schemeClr val="accent1"/>
+          </a:effectRef>
+          <a:fontRef idx="minor">
+            <a:schemeClr val="lt1"/>
+          </a:fontRef>
+        </p:style>
+        <p:txBody>
+          <a:bodyPr rtlCol="0" anchor="ctr"/>
+          <a:lstStyle/>
+          <a:p>
+            <a:pPr algn="ctr"/>
+            <a:endParaRPr lang="en-US"/>
+          </a:p>
+        </p:txBody>
+      </p:sp>
+      <p:sp>
+        <p:nvSpPr>
+          <p:cNvPr id="8" name="Rectangle: Rounded Corners 7">
+            <a:extLst>
+              <a:ext uri="{FF2B5EF4-FFF2-40B4-BE49-F238E27FC236}">
+                <a16:creationId xmlns:a16="http://schemas.microsoft.com/office/drawing/2014/main" id="{E5E54339-83B4-ED8E-EDEE-32F3341C691F}"/>
+              </a:ext>
+            </a:extLst>
+          </p:cNvPr>
+          <p:cNvSpPr/>
+          <p:nvPr/>
+        </p:nvSpPr>
+        <p:spPr>
+          <a:xfrm>
+            <a:off x="-845087" y="6129380"/>
+            <a:ext cx="4629675" cy="998831"/>
+          </a:xfrm>
+          <a:prstGeom prst="roundRect">
+            <a:avLst>
+              <a:gd name="adj" fmla="val 50000"/>
+            </a:avLst>
+          </a:prstGeom>
+          <a:ln>
+            <a:noFill/>
+          </a:ln>
+        </p:spPr>
+        <p:style>
+          <a:lnRef idx="0">
+            <a:schemeClr val="accent1"/>
+          </a:lnRef>
+          <a:fillRef idx="3">
+            <a:schemeClr val="accent1"/>
+          </a:fillRef>
+          <a:effectRef idx="3">
+            <a:schemeClr val="accent1"/>
+          </a:effectRef>
+          <a:fontRef idx="minor">
+            <a:schemeClr val="lt1"/>
+          </a:fontRef>
+        </p:style>
+        <p:txBody>
+          <a:bodyPr rtlCol="0" anchor="ctr"/>
+          <a:lstStyle/>
+          <a:p>
+            <a:pPr algn="ctr"/>
+            <a:endParaRPr lang="en-US"/>
+          </a:p>
+        </p:txBody>
+      </p:sp>
+      <p:sp>
+        <p:nvSpPr>
+          <p:cNvPr id="5" name="Rectangle: Rounded Corners 4">
+            <a:extLst>
+              <a:ext uri="{FF2B5EF4-FFF2-40B4-BE49-F238E27FC236}">
+                <a16:creationId xmlns:a16="http://schemas.microsoft.com/office/drawing/2014/main" id="{210DC2FE-9FC8-C7F2-1E1D-E39943F09EDC}"/>
+              </a:ext>
+            </a:extLst>
+          </p:cNvPr>
+          <p:cNvSpPr/>
+          <p:nvPr/>
+        </p:nvSpPr>
+        <p:spPr>
+          <a:xfrm>
+            <a:off x="-2934457" y="21086"/>
+            <a:ext cx="6081251" cy="1393371"/>
+          </a:xfrm>
+          <a:prstGeom prst="roundRect">
+            <a:avLst>
+              <a:gd name="adj" fmla="val 50000"/>
+            </a:avLst>
+          </a:prstGeom>
         </p:spPr>
         <p:style>
           <a:lnRef idx="2">
@@ -4632,16 +5682,16 @@
           <a:lstStyle/>
           <a:p>
             <a:pPr algn="ctr"/>
-            <a:endParaRPr lang="en-US" dirty="0"/>
+            <a:endParaRPr lang="en-US"/>
           </a:p>
         </p:txBody>
       </p:sp>
       <p:pic>
         <p:nvPicPr>
-          <p:cNvPr id="36" name="Picture 35" descr="A picture containing text&#10;&#10;Description automatically generated">
-            <a:extLst>
-              <a:ext uri="{FF2B5EF4-FFF2-40B4-BE49-F238E27FC236}">
-                <a16:creationId xmlns:a16="http://schemas.microsoft.com/office/drawing/2014/main" id="{E1EA742A-0A00-AC3F-8B4D-D3BEA640D5C0}"/>
+          <p:cNvPr id="70" name="Picture 69" descr="A picture containing text&#10;&#10;Description automatically generated">
+            <a:extLst>
+              <a:ext uri="{FF2B5EF4-FFF2-40B4-BE49-F238E27FC236}">
+                <a16:creationId xmlns:a16="http://schemas.microsoft.com/office/drawing/2014/main" id="{5627B069-4CF3-8894-0AF3-0CF21F59E850}"/>
               </a:ext>
             </a:extLst>
           </p:cNvPr>
@@ -4651,7 +5701,7 @@
           <p:nvPr/>
         </p:nvPicPr>
         <p:blipFill>
-          <a:blip r:embed="rId4">
+          <a:blip r:embed="rId2">
             <a:extLst>
               <a:ext uri="{28A0092B-C50C-407E-A947-70E740481C1C}">
                 <a14:useLocalDpi xmlns:a14="http://schemas.microsoft.com/office/drawing/2010/main" val="0"/>
@@ -4664,269 +5714,56 @@
         </p:blipFill>
         <p:spPr>
           <a:xfrm>
-            <a:off x="-763595" y="5704696"/>
-            <a:ext cx="3246768" cy="1665009"/>
+            <a:off x="353071" y="3421366"/>
+            <a:ext cx="1085850" cy="1114425"/>
           </a:xfrm>
           <a:prstGeom prst="rect">
             <a:avLst/>
           </a:prstGeom>
         </p:spPr>
       </p:pic>
-      <p:sp>
-        <p:nvSpPr>
-          <p:cNvPr id="50" name="TextBox 49">
-            <a:extLst>
-              <a:ext uri="{FF2B5EF4-FFF2-40B4-BE49-F238E27FC236}">
-                <a16:creationId xmlns:a16="http://schemas.microsoft.com/office/drawing/2014/main" id="{AA5CB5F5-7C1A-59D2-D919-C4623F776D23}"/>
-              </a:ext>
-            </a:extLst>
-          </p:cNvPr>
-          <p:cNvSpPr txBox="1"/>
+      <p:pic>
+        <p:nvPicPr>
+          <p:cNvPr id="68" name="Picture 67" descr="Chart, histogram&#10;&#10;Description automatically generated">
+            <a:extLst>
+              <a:ext uri="{FF2B5EF4-FFF2-40B4-BE49-F238E27FC236}">
+                <a16:creationId xmlns:a16="http://schemas.microsoft.com/office/drawing/2014/main" id="{A6661141-28DD-99B5-C6CD-492AF21F34FC}"/>
+              </a:ext>
+            </a:extLst>
+          </p:cNvPr>
+          <p:cNvPicPr>
+            <a:picLocks noChangeAspect="1"/>
+          </p:cNvPicPr>
           <p:nvPr/>
-        </p:nvSpPr>
-        <p:spPr>
-          <a:xfrm>
-            <a:off x="243840" y="395914"/>
-            <a:ext cx="4718304" cy="369332"/>
+        </p:nvPicPr>
+        <p:blipFill>
+          <a:blip r:embed="rId3">
+            <a:extLst>
+              <a:ext uri="{28A0092B-C50C-407E-A947-70E740481C1C}">
+                <a14:useLocalDpi xmlns:a14="http://schemas.microsoft.com/office/drawing/2010/main" val="0"/>
+              </a:ext>
+            </a:extLst>
+          </a:blip>
+          <a:stretch>
+            <a:fillRect/>
+          </a:stretch>
+        </p:blipFill>
+        <p:spPr>
+          <a:xfrm>
+            <a:off x="438796" y="4841128"/>
+            <a:ext cx="914400" cy="1114425"/>
           </a:xfrm>
           <a:prstGeom prst="rect">
             <a:avLst/>
           </a:prstGeom>
-          <a:noFill/>
-        </p:spPr>
-        <p:txBody>
-          <a:bodyPr wrap="square" rtlCol="0">
-            <a:spAutoFit/>
-          </a:bodyPr>
-          <a:lstStyle/>
-          <a:p>
-            <a:r>
-              <a:rPr lang="en-US" dirty="0"/>
-              <a:t>Controls</a:t>
-            </a:r>
-          </a:p>
-        </p:txBody>
-      </p:sp>
-      <p:sp>
-        <p:nvSpPr>
-          <p:cNvPr id="56" name="TextBox 55">
-            <a:extLst>
-              <a:ext uri="{FF2B5EF4-FFF2-40B4-BE49-F238E27FC236}">
-                <a16:creationId xmlns:a16="http://schemas.microsoft.com/office/drawing/2014/main" id="{C1CEE3DB-1EF4-80C5-B1B2-27EC54308753}"/>
-              </a:ext>
-            </a:extLst>
-          </p:cNvPr>
-          <p:cNvSpPr txBox="1"/>
-          <p:nvPr/>
-        </p:nvSpPr>
-        <p:spPr>
-          <a:xfrm>
-            <a:off x="85053" y="1594776"/>
-            <a:ext cx="2191286" cy="1200329"/>
-          </a:xfrm>
-          <a:prstGeom prst="rect">
-            <a:avLst/>
-          </a:prstGeom>
-          <a:noFill/>
-        </p:spPr>
-        <p:txBody>
-          <a:bodyPr wrap="square" rtlCol="0">
-            <a:spAutoFit/>
-          </a:bodyPr>
-          <a:lstStyle/>
-          <a:p>
-            <a:pPr algn="ctr"/>
-            <a:r>
-              <a:rPr lang="en-US" dirty="0"/>
-              <a:t>These Controls are for when you're using a mouse and keyboard</a:t>
-            </a:r>
-          </a:p>
-        </p:txBody>
-      </p:sp>
-      <p:sp>
-        <p:nvSpPr>
-          <p:cNvPr id="57" name="TextBox 56">
-            <a:extLst>
-              <a:ext uri="{FF2B5EF4-FFF2-40B4-BE49-F238E27FC236}">
-                <a16:creationId xmlns:a16="http://schemas.microsoft.com/office/drawing/2014/main" id="{400A0492-7455-8806-A5A9-5990F9EB6778}"/>
-              </a:ext>
-            </a:extLst>
-          </p:cNvPr>
-          <p:cNvSpPr txBox="1"/>
-          <p:nvPr/>
-        </p:nvSpPr>
-        <p:spPr>
-          <a:xfrm>
-            <a:off x="1269945" y="6080217"/>
-            <a:ext cx="980636" cy="923330"/>
-          </a:xfrm>
-          <a:prstGeom prst="rect">
-            <a:avLst/>
-          </a:prstGeom>
-          <a:noFill/>
-        </p:spPr>
-        <p:txBody>
-          <a:bodyPr wrap="square" rtlCol="0">
-            <a:spAutoFit/>
-          </a:bodyPr>
-          <a:lstStyle/>
-          <a:p>
-            <a:pPr algn="ctr"/>
-            <a:r>
-              <a:rPr lang="en-US" dirty="0"/>
-              <a:t>Left Mouse Click</a:t>
-            </a:r>
-          </a:p>
-        </p:txBody>
-      </p:sp>
-      <p:sp>
-        <p:nvSpPr>
-          <p:cNvPr id="58" name="TextBox 57">
-            <a:extLst>
-              <a:ext uri="{FF2B5EF4-FFF2-40B4-BE49-F238E27FC236}">
-                <a16:creationId xmlns:a16="http://schemas.microsoft.com/office/drawing/2014/main" id="{B9CC29EE-5EF4-4BE4-93BD-88D22ACB52C3}"/>
-              </a:ext>
-            </a:extLst>
-          </p:cNvPr>
-          <p:cNvSpPr txBox="1"/>
-          <p:nvPr/>
-        </p:nvSpPr>
-        <p:spPr>
-          <a:xfrm>
-            <a:off x="2016784" y="6394985"/>
-            <a:ext cx="1572368" cy="369332"/>
-          </a:xfrm>
-          <a:prstGeom prst="rect">
-            <a:avLst/>
-          </a:prstGeom>
-          <a:noFill/>
-        </p:spPr>
-        <p:txBody>
-          <a:bodyPr wrap="square" rtlCol="0">
-            <a:spAutoFit/>
-          </a:bodyPr>
-          <a:lstStyle/>
-          <a:p>
-            <a:pPr algn="ctr"/>
-            <a:r>
-              <a:rPr lang="en-US" dirty="0"/>
-              <a:t>=     Attack!</a:t>
-            </a:r>
-          </a:p>
-        </p:txBody>
-      </p:sp>
-      <p:sp>
-        <p:nvSpPr>
-          <p:cNvPr id="60" name="TextBox 59">
-            <a:extLst>
-              <a:ext uri="{FF2B5EF4-FFF2-40B4-BE49-F238E27FC236}">
-                <a16:creationId xmlns:a16="http://schemas.microsoft.com/office/drawing/2014/main" id="{A2844563-DECF-2C56-8C7D-1E7D8C319E43}"/>
-              </a:ext>
-            </a:extLst>
-          </p:cNvPr>
-          <p:cNvSpPr txBox="1"/>
-          <p:nvPr/>
-        </p:nvSpPr>
-        <p:spPr>
-          <a:xfrm>
-            <a:off x="1711274" y="3629520"/>
-            <a:ext cx="1572368" cy="923330"/>
-          </a:xfrm>
-          <a:prstGeom prst="rect">
-            <a:avLst/>
-          </a:prstGeom>
-          <a:noFill/>
-        </p:spPr>
-        <p:txBody>
-          <a:bodyPr wrap="square" rtlCol="0">
-            <a:spAutoFit/>
-          </a:bodyPr>
-          <a:lstStyle/>
-          <a:p>
-            <a:pPr algn="ctr"/>
-            <a:r>
-              <a:rPr lang="en-US" dirty="0"/>
-              <a:t>Pick up an item/ throw the item</a:t>
-            </a:r>
-          </a:p>
-        </p:txBody>
-      </p:sp>
-      <p:sp>
-        <p:nvSpPr>
-          <p:cNvPr id="63" name="TextBox 62">
-            <a:extLst>
-              <a:ext uri="{FF2B5EF4-FFF2-40B4-BE49-F238E27FC236}">
-                <a16:creationId xmlns:a16="http://schemas.microsoft.com/office/drawing/2014/main" id="{035F981A-E05A-CF49-3604-288F0CD11EDC}"/>
-              </a:ext>
-            </a:extLst>
-          </p:cNvPr>
-          <p:cNvSpPr txBox="1"/>
-          <p:nvPr/>
-        </p:nvSpPr>
-        <p:spPr>
-          <a:xfrm>
-            <a:off x="1469751" y="3890080"/>
-            <a:ext cx="581025" cy="369332"/>
-          </a:xfrm>
-          <a:prstGeom prst="rect">
-            <a:avLst/>
-          </a:prstGeom>
-          <a:noFill/>
-        </p:spPr>
-        <p:txBody>
-          <a:bodyPr wrap="square" rtlCol="0">
-            <a:spAutoFit/>
-          </a:bodyPr>
-          <a:lstStyle/>
-          <a:p>
-            <a:r>
-              <a:rPr lang="en-US" dirty="0"/>
-              <a:t>F =</a:t>
-            </a:r>
-          </a:p>
-        </p:txBody>
-      </p:sp>
-      <p:sp>
-        <p:nvSpPr>
-          <p:cNvPr id="64" name="TextBox 63">
-            <a:extLst>
-              <a:ext uri="{FF2B5EF4-FFF2-40B4-BE49-F238E27FC236}">
-                <a16:creationId xmlns:a16="http://schemas.microsoft.com/office/drawing/2014/main" id="{3D179706-8B04-7F10-20B9-5B99292ACD67}"/>
-              </a:ext>
-            </a:extLst>
-          </p:cNvPr>
-          <p:cNvSpPr txBox="1"/>
-          <p:nvPr/>
-        </p:nvSpPr>
-        <p:spPr>
-          <a:xfrm>
-            <a:off x="1438921" y="5162052"/>
-            <a:ext cx="3396888" cy="369332"/>
-          </a:xfrm>
-          <a:prstGeom prst="rect">
-            <a:avLst/>
-          </a:prstGeom>
-          <a:noFill/>
-        </p:spPr>
-        <p:txBody>
-          <a:bodyPr wrap="square" rtlCol="0">
-            <a:spAutoFit/>
-          </a:bodyPr>
-          <a:lstStyle/>
-          <a:p>
-            <a:r>
-              <a:rPr lang="en-US" dirty="0"/>
-              <a:t>Space Bar to Dash</a:t>
-            </a:r>
-          </a:p>
-        </p:txBody>
-      </p:sp>
-      <p:sp>
-        <p:nvSpPr>
-          <p:cNvPr id="72" name="Arrow: Down 71">
-            <a:extLst>
-              <a:ext uri="{FF2B5EF4-FFF2-40B4-BE49-F238E27FC236}">
-                <a16:creationId xmlns:a16="http://schemas.microsoft.com/office/drawing/2014/main" id="{92894FAC-5BAD-E180-C507-ABE08E2D7940}"/>
+        </p:spPr>
+      </p:pic>
+      <p:sp>
+        <p:nvSpPr>
+          <p:cNvPr id="42" name="Arrow: Down 41">
+            <a:extLst>
+              <a:ext uri="{FF2B5EF4-FFF2-40B4-BE49-F238E27FC236}">
+                <a16:creationId xmlns:a16="http://schemas.microsoft.com/office/drawing/2014/main" id="{E99080F4-7341-77B6-63D3-186982F57B76}"/>
               </a:ext>
             </a:extLst>
           </p:cNvPr>
@@ -4934,8 +5771,8 @@
           <p:nvPr/>
         </p:nvSpPr>
         <p:spPr>
-          <a:xfrm rot="16200000">
-            <a:off x="3150954" y="1685627"/>
+          <a:xfrm rot="10800000">
+            <a:off x="2998554" y="1533227"/>
             <a:ext cx="886649" cy="1636199"/>
           </a:xfrm>
           <a:prstGeom prst="downArrow">
@@ -4970,12 +5807,335 @@
           </a:p>
         </p:txBody>
       </p:sp>
-      <p:sp>
-        <p:nvSpPr>
-          <p:cNvPr id="73" name="Arrow: Down 72">
-            <a:extLst>
-              <a:ext uri="{FF2B5EF4-FFF2-40B4-BE49-F238E27FC236}">
-                <a16:creationId xmlns:a16="http://schemas.microsoft.com/office/drawing/2014/main" id="{8A2C93B3-2585-0BB8-17B4-E30A50400D8F}"/>
+      <p:pic>
+        <p:nvPicPr>
+          <p:cNvPr id="36" name="Picture 35" descr="A picture containing text&#10;&#10;Description automatically generated">
+            <a:extLst>
+              <a:ext uri="{FF2B5EF4-FFF2-40B4-BE49-F238E27FC236}">
+                <a16:creationId xmlns:a16="http://schemas.microsoft.com/office/drawing/2014/main" id="{E1EA742A-0A00-AC3F-8B4D-D3BEA640D5C0}"/>
+              </a:ext>
+            </a:extLst>
+          </p:cNvPr>
+          <p:cNvPicPr>
+            <a:picLocks noChangeAspect="1"/>
+          </p:cNvPicPr>
+          <p:nvPr/>
+        </p:nvPicPr>
+        <p:blipFill>
+          <a:blip r:embed="rId4">
+            <a:extLst>
+              <a:ext uri="{28A0092B-C50C-407E-A947-70E740481C1C}">
+                <a14:useLocalDpi xmlns:a14="http://schemas.microsoft.com/office/drawing/2010/main" val="0"/>
+              </a:ext>
+            </a:extLst>
+          </a:blip>
+          <a:stretch>
+            <a:fillRect/>
+          </a:stretch>
+        </p:blipFill>
+        <p:spPr>
+          <a:xfrm>
+            <a:off x="-763595" y="5704696"/>
+            <a:ext cx="3246768" cy="1665009"/>
+          </a:xfrm>
+          <a:prstGeom prst="rect">
+            <a:avLst/>
+          </a:prstGeom>
+        </p:spPr>
+      </p:pic>
+      <p:sp>
+        <p:nvSpPr>
+          <p:cNvPr id="50" name="TextBox 49">
+            <a:extLst>
+              <a:ext uri="{FF2B5EF4-FFF2-40B4-BE49-F238E27FC236}">
+                <a16:creationId xmlns:a16="http://schemas.microsoft.com/office/drawing/2014/main" id="{AA5CB5F5-7C1A-59D2-D919-C4623F776D23}"/>
+              </a:ext>
+            </a:extLst>
+          </p:cNvPr>
+          <p:cNvSpPr txBox="1"/>
+          <p:nvPr/>
+        </p:nvSpPr>
+        <p:spPr>
+          <a:xfrm>
+            <a:off x="243840" y="395914"/>
+            <a:ext cx="4718304" cy="830997"/>
+          </a:xfrm>
+          <a:prstGeom prst="rect">
+            <a:avLst/>
+          </a:prstGeom>
+          <a:noFill/>
+        </p:spPr>
+        <p:txBody>
+          <a:bodyPr wrap="square" rtlCol="0">
+            <a:spAutoFit/>
+          </a:bodyPr>
+          <a:lstStyle/>
+          <a:p>
+            <a:r>
+              <a:rPr lang="en-US" sz="4800" dirty="0">
+                <a:latin typeface="Times New Roman" panose="02020603050405020304" pitchFamily="18" charset="0"/>
+                <a:cs typeface="Times New Roman" panose="02020603050405020304" pitchFamily="18" charset="0"/>
+              </a:rPr>
+              <a:t>Controls</a:t>
+            </a:r>
+            <a:endParaRPr lang="en-US" dirty="0">
+              <a:latin typeface="Times New Roman" panose="02020603050405020304" pitchFamily="18" charset="0"/>
+              <a:cs typeface="Times New Roman" panose="02020603050405020304" pitchFamily="18" charset="0"/>
+            </a:endParaRPr>
+          </a:p>
+        </p:txBody>
+      </p:sp>
+      <p:sp>
+        <p:nvSpPr>
+          <p:cNvPr id="56" name="TextBox 55">
+            <a:extLst>
+              <a:ext uri="{FF2B5EF4-FFF2-40B4-BE49-F238E27FC236}">
+                <a16:creationId xmlns:a16="http://schemas.microsoft.com/office/drawing/2014/main" id="{C1CEE3DB-1EF4-80C5-B1B2-27EC54308753}"/>
+              </a:ext>
+            </a:extLst>
+          </p:cNvPr>
+          <p:cNvSpPr txBox="1"/>
+          <p:nvPr/>
+        </p:nvSpPr>
+        <p:spPr>
+          <a:xfrm>
+            <a:off x="4313643" y="4535791"/>
+            <a:ext cx="2191286" cy="1200329"/>
+          </a:xfrm>
+          <a:prstGeom prst="rect">
+            <a:avLst/>
+          </a:prstGeom>
+        </p:spPr>
+        <p:style>
+          <a:lnRef idx="1">
+            <a:schemeClr val="dk1"/>
+          </a:lnRef>
+          <a:fillRef idx="2">
+            <a:schemeClr val="dk1"/>
+          </a:fillRef>
+          <a:effectRef idx="1">
+            <a:schemeClr val="dk1"/>
+          </a:effectRef>
+          <a:fontRef idx="minor">
+            <a:schemeClr val="dk1"/>
+          </a:fontRef>
+        </p:style>
+        <p:txBody>
+          <a:bodyPr wrap="square" rtlCol="0">
+            <a:spAutoFit/>
+          </a:bodyPr>
+          <a:lstStyle/>
+          <a:p>
+            <a:pPr algn="ctr"/>
+            <a:r>
+              <a:rPr lang="en-US" dirty="0">
+                <a:latin typeface="Times New Roman" panose="02020603050405020304" pitchFamily="18" charset="0"/>
+                <a:cs typeface="Times New Roman" panose="02020603050405020304" pitchFamily="18" charset="0"/>
+              </a:rPr>
+              <a:t>These Controls are for when you're using a mouse and keyboard</a:t>
+            </a:r>
+          </a:p>
+        </p:txBody>
+      </p:sp>
+      <p:sp>
+        <p:nvSpPr>
+          <p:cNvPr id="57" name="TextBox 56">
+            <a:extLst>
+              <a:ext uri="{FF2B5EF4-FFF2-40B4-BE49-F238E27FC236}">
+                <a16:creationId xmlns:a16="http://schemas.microsoft.com/office/drawing/2014/main" id="{400A0492-7455-8806-A5A9-5990F9EB6778}"/>
+              </a:ext>
+            </a:extLst>
+          </p:cNvPr>
+          <p:cNvSpPr txBox="1"/>
+          <p:nvPr/>
+        </p:nvSpPr>
+        <p:spPr>
+          <a:xfrm>
+            <a:off x="1269945" y="6080217"/>
+            <a:ext cx="980636" cy="923330"/>
+          </a:xfrm>
+          <a:prstGeom prst="rect">
+            <a:avLst/>
+          </a:prstGeom>
+          <a:noFill/>
+        </p:spPr>
+        <p:txBody>
+          <a:bodyPr wrap="square" rtlCol="0">
+            <a:spAutoFit/>
+          </a:bodyPr>
+          <a:lstStyle/>
+          <a:p>
+            <a:pPr algn="ctr"/>
+            <a:r>
+              <a:rPr lang="en-US" dirty="0">
+                <a:latin typeface="Times New Roman" panose="02020603050405020304" pitchFamily="18" charset="0"/>
+                <a:cs typeface="Times New Roman" panose="02020603050405020304" pitchFamily="18" charset="0"/>
+              </a:rPr>
+              <a:t>Left Mouse Click</a:t>
+            </a:r>
+          </a:p>
+        </p:txBody>
+      </p:sp>
+      <p:sp>
+        <p:nvSpPr>
+          <p:cNvPr id="58" name="TextBox 57">
+            <a:extLst>
+              <a:ext uri="{FF2B5EF4-FFF2-40B4-BE49-F238E27FC236}">
+                <a16:creationId xmlns:a16="http://schemas.microsoft.com/office/drawing/2014/main" id="{B9CC29EE-5EF4-4BE4-93BD-88D22ACB52C3}"/>
+              </a:ext>
+            </a:extLst>
+          </p:cNvPr>
+          <p:cNvSpPr txBox="1"/>
+          <p:nvPr/>
+        </p:nvSpPr>
+        <p:spPr>
+          <a:xfrm>
+            <a:off x="2016784" y="6394985"/>
+            <a:ext cx="1572368" cy="369332"/>
+          </a:xfrm>
+          <a:prstGeom prst="rect">
+            <a:avLst/>
+          </a:prstGeom>
+          <a:noFill/>
+        </p:spPr>
+        <p:txBody>
+          <a:bodyPr wrap="square" rtlCol="0">
+            <a:spAutoFit/>
+          </a:bodyPr>
+          <a:lstStyle/>
+          <a:p>
+            <a:pPr algn="ctr"/>
+            <a:r>
+              <a:rPr lang="en-US" dirty="0">
+                <a:latin typeface="Times New Roman" panose="02020603050405020304" pitchFamily="18" charset="0"/>
+                <a:cs typeface="Times New Roman" panose="02020603050405020304" pitchFamily="18" charset="0"/>
+              </a:rPr>
+              <a:t>=     Attack!</a:t>
+            </a:r>
+          </a:p>
+        </p:txBody>
+      </p:sp>
+      <p:sp>
+        <p:nvSpPr>
+          <p:cNvPr id="60" name="TextBox 59">
+            <a:extLst>
+              <a:ext uri="{FF2B5EF4-FFF2-40B4-BE49-F238E27FC236}">
+                <a16:creationId xmlns:a16="http://schemas.microsoft.com/office/drawing/2014/main" id="{A2844563-DECF-2C56-8C7D-1E7D8C319E43}"/>
+              </a:ext>
+            </a:extLst>
+          </p:cNvPr>
+          <p:cNvSpPr txBox="1"/>
+          <p:nvPr/>
+        </p:nvSpPr>
+        <p:spPr>
+          <a:xfrm>
+            <a:off x="1711274" y="3629520"/>
+            <a:ext cx="1572368" cy="923330"/>
+          </a:xfrm>
+          <a:prstGeom prst="rect">
+            <a:avLst/>
+          </a:prstGeom>
+          <a:noFill/>
+        </p:spPr>
+        <p:txBody>
+          <a:bodyPr wrap="square" rtlCol="0">
+            <a:spAutoFit/>
+          </a:bodyPr>
+          <a:lstStyle/>
+          <a:p>
+            <a:pPr algn="ctr"/>
+            <a:r>
+              <a:rPr lang="en-US" dirty="0">
+                <a:latin typeface="Times New Roman" panose="02020603050405020304" pitchFamily="18" charset="0"/>
+                <a:cs typeface="Times New Roman" panose="02020603050405020304" pitchFamily="18" charset="0"/>
+              </a:rPr>
+              <a:t>Pick up an item/ throw the item</a:t>
+            </a:r>
+          </a:p>
+        </p:txBody>
+      </p:sp>
+      <p:sp>
+        <p:nvSpPr>
+          <p:cNvPr id="63" name="TextBox 62">
+            <a:extLst>
+              <a:ext uri="{FF2B5EF4-FFF2-40B4-BE49-F238E27FC236}">
+                <a16:creationId xmlns:a16="http://schemas.microsoft.com/office/drawing/2014/main" id="{035F981A-E05A-CF49-3604-288F0CD11EDC}"/>
+              </a:ext>
+            </a:extLst>
+          </p:cNvPr>
+          <p:cNvSpPr txBox="1"/>
+          <p:nvPr/>
+        </p:nvSpPr>
+        <p:spPr>
+          <a:xfrm>
+            <a:off x="1469751" y="3890080"/>
+            <a:ext cx="581025" cy="369332"/>
+          </a:xfrm>
+          <a:prstGeom prst="rect">
+            <a:avLst/>
+          </a:prstGeom>
+          <a:noFill/>
+        </p:spPr>
+        <p:txBody>
+          <a:bodyPr wrap="square" rtlCol="0">
+            <a:spAutoFit/>
+          </a:bodyPr>
+          <a:lstStyle/>
+          <a:p>
+            <a:r>
+              <a:rPr lang="en-US" dirty="0">
+                <a:latin typeface="Times New Roman" panose="02020603050405020304" pitchFamily="18" charset="0"/>
+                <a:cs typeface="Times New Roman" panose="02020603050405020304" pitchFamily="18" charset="0"/>
+              </a:rPr>
+              <a:t>F =</a:t>
+            </a:r>
+          </a:p>
+        </p:txBody>
+      </p:sp>
+      <p:sp>
+        <p:nvSpPr>
+          <p:cNvPr id="64" name="TextBox 63">
+            <a:extLst>
+              <a:ext uri="{FF2B5EF4-FFF2-40B4-BE49-F238E27FC236}">
+                <a16:creationId xmlns:a16="http://schemas.microsoft.com/office/drawing/2014/main" id="{3D179706-8B04-7F10-20B9-5B99292ACD67}"/>
+              </a:ext>
+            </a:extLst>
+          </p:cNvPr>
+          <p:cNvSpPr txBox="1"/>
+          <p:nvPr/>
+        </p:nvSpPr>
+        <p:spPr>
+          <a:xfrm>
+            <a:off x="1438921" y="5162052"/>
+            <a:ext cx="3396888" cy="369332"/>
+          </a:xfrm>
+          <a:prstGeom prst="rect">
+            <a:avLst/>
+          </a:prstGeom>
+          <a:noFill/>
+        </p:spPr>
+        <p:txBody>
+          <a:bodyPr wrap="square" rtlCol="0">
+            <a:spAutoFit/>
+          </a:bodyPr>
+          <a:lstStyle/>
+          <a:p>
+            <a:r>
+              <a:rPr lang="en-US" dirty="0">
+                <a:latin typeface="Times New Roman" panose="02020603050405020304" pitchFamily="18" charset="0"/>
+                <a:cs typeface="Times New Roman" panose="02020603050405020304" pitchFamily="18" charset="0"/>
+              </a:rPr>
+              <a:t>Space Bar to Dash</a:t>
+            </a:r>
+          </a:p>
+        </p:txBody>
+      </p:sp>
+      <p:sp>
+        <p:nvSpPr>
+          <p:cNvPr id="72" name="Arrow: Down 71">
+            <a:extLst>
+              <a:ext uri="{FF2B5EF4-FFF2-40B4-BE49-F238E27FC236}">
+                <a16:creationId xmlns:a16="http://schemas.microsoft.com/office/drawing/2014/main" id="{92894FAC-5BAD-E180-C507-ABE08E2D7940}"/>
               </a:ext>
             </a:extLst>
           </p:cNvPr>
@@ -4983,8 +6143,8 @@
           <p:nvPr/>
         </p:nvSpPr>
         <p:spPr>
-          <a:xfrm rot="5400000">
-            <a:off x="2857948" y="1685626"/>
+          <a:xfrm rot="16200000">
+            <a:off x="3150954" y="1685627"/>
             <a:ext cx="886649" cy="1636199"/>
           </a:xfrm>
           <a:prstGeom prst="downArrow">
@@ -5021,10 +6181,10 @@
       </p:sp>
       <p:sp>
         <p:nvSpPr>
-          <p:cNvPr id="74" name="Arrow: Down 73">
-            <a:extLst>
-              <a:ext uri="{FF2B5EF4-FFF2-40B4-BE49-F238E27FC236}">
-                <a16:creationId xmlns:a16="http://schemas.microsoft.com/office/drawing/2014/main" id="{D65707E4-68DA-26C2-6191-AFA7070F3B50}"/>
+          <p:cNvPr id="73" name="Arrow: Down 72">
+            <a:extLst>
+              <a:ext uri="{FF2B5EF4-FFF2-40B4-BE49-F238E27FC236}">
+                <a16:creationId xmlns:a16="http://schemas.microsoft.com/office/drawing/2014/main" id="{8A2C93B3-2585-0BB8-17B4-E30A50400D8F}"/>
               </a:ext>
             </a:extLst>
           </p:cNvPr>
@@ -5032,8 +6192,8 @@
           <p:nvPr/>
         </p:nvSpPr>
         <p:spPr>
-          <a:xfrm rot="10800000" flipV="1">
-            <a:off x="2992864" y="1906435"/>
+          <a:xfrm rot="5400000">
+            <a:off x="2857948" y="1685626"/>
             <a:ext cx="886649" cy="1636199"/>
           </a:xfrm>
           <a:prstGeom prst="downArrow">
@@ -5068,6 +6228,55 @@
           </a:p>
         </p:txBody>
       </p:sp>
+      <p:sp>
+        <p:nvSpPr>
+          <p:cNvPr id="74" name="Arrow: Down 73">
+            <a:extLst>
+              <a:ext uri="{FF2B5EF4-FFF2-40B4-BE49-F238E27FC236}">
+                <a16:creationId xmlns:a16="http://schemas.microsoft.com/office/drawing/2014/main" id="{D65707E4-68DA-26C2-6191-AFA7070F3B50}"/>
+              </a:ext>
+            </a:extLst>
+          </p:cNvPr>
+          <p:cNvSpPr/>
+          <p:nvPr/>
+        </p:nvSpPr>
+        <p:spPr>
+          <a:xfrm rot="10800000" flipV="1">
+            <a:off x="2992864" y="1906435"/>
+            <a:ext cx="886649" cy="1636199"/>
+          </a:xfrm>
+          <a:prstGeom prst="downArrow">
+            <a:avLst/>
+          </a:prstGeom>
+          <a:ln>
+            <a:noFill/>
+          </a:ln>
+        </p:spPr>
+        <p:style>
+          <a:lnRef idx="2">
+            <a:schemeClr val="accent1">
+              <a:shade val="50000"/>
+            </a:schemeClr>
+          </a:lnRef>
+          <a:fillRef idx="1">
+            <a:schemeClr val="accent1"/>
+          </a:fillRef>
+          <a:effectRef idx="0">
+            <a:schemeClr val="accent1"/>
+          </a:effectRef>
+          <a:fontRef idx="minor">
+            <a:schemeClr val="lt1"/>
+          </a:fontRef>
+        </p:style>
+        <p:txBody>
+          <a:bodyPr rtlCol="0" anchor="ctr"/>
+          <a:lstStyle/>
+          <a:p>
+            <a:pPr algn="ctr"/>
+            <a:endParaRPr lang="en-US" dirty="0"/>
+          </a:p>
+        </p:txBody>
+      </p:sp>
       <p:pic>
         <p:nvPicPr>
           <p:cNvPr id="28" name="Picture 27" descr="A picture containing chart&#10;&#10;Description automatically generated">
@@ -5243,7 +6452,8 @@
             <a:pPr algn="ctr"/>
             <a:r>
               <a:rPr lang="en-US" b="1" dirty="0">
-                <a:latin typeface="+mj-lt"/>
+                <a:latin typeface="Times New Roman" panose="02020603050405020304" pitchFamily="18" charset="0"/>
+                <a:cs typeface="Times New Roman" panose="02020603050405020304" pitchFamily="18" charset="0"/>
               </a:rPr>
               <a:t>W</a:t>
             </a:r>
@@ -5281,7 +6491,8 @@
             <a:pPr algn="ctr"/>
             <a:r>
               <a:rPr lang="en-US" b="1" dirty="0">
-                <a:latin typeface="+mj-lt"/>
+                <a:latin typeface="Times New Roman" panose="02020603050405020304" pitchFamily="18" charset="0"/>
+                <a:cs typeface="Times New Roman" panose="02020603050405020304" pitchFamily="18" charset="0"/>
               </a:rPr>
               <a:t>A</a:t>
             </a:r>
@@ -5319,7 +6530,8 @@
             <a:pPr algn="ctr"/>
             <a:r>
               <a:rPr lang="en-US" b="1" dirty="0">
-                <a:latin typeface="+mj-lt"/>
+                <a:latin typeface="Times New Roman" panose="02020603050405020304" pitchFamily="18" charset="0"/>
+                <a:cs typeface="Times New Roman" panose="02020603050405020304" pitchFamily="18" charset="0"/>
               </a:rPr>
               <a:t>D</a:t>
             </a:r>
@@ -5357,7 +6569,8 @@
             <a:pPr algn="ctr"/>
             <a:r>
               <a:rPr lang="en-US" b="1" dirty="0">
-                <a:latin typeface="+mj-lt"/>
+                <a:latin typeface="Times New Roman" panose="02020603050405020304" pitchFamily="18" charset="0"/>
+                <a:cs typeface="Times New Roman" panose="02020603050405020304" pitchFamily="18" charset="0"/>
               </a:rPr>
               <a:t>S</a:t>
             </a:r>
@@ -5378,8 +6591,8 @@
         </p:nvSpPr>
         <p:spPr>
           <a:xfrm>
-            <a:off x="247489" y="7395926"/>
-            <a:ext cx="6333615" cy="923330"/>
+            <a:off x="4542833" y="6026935"/>
+            <a:ext cx="1962095" cy="923330"/>
           </a:xfrm>
           <a:prstGeom prst="rect">
             <a:avLst/>
@@ -5393,21 +6606,66 @@
           <a:lstStyle/>
           <a:p>
             <a:r>
-              <a:rPr lang="en-US" dirty="0"/>
+              <a:rPr lang="en-US" dirty="0">
+                <a:latin typeface="Times New Roman" panose="02020603050405020304" pitchFamily="18" charset="0"/>
+                <a:cs typeface="Times New Roman" panose="02020603050405020304" pitchFamily="18" charset="0"/>
+              </a:rPr>
               <a:t>Esc = Pause menu</a:t>
             </a:r>
           </a:p>
           <a:p>
-            <a:endParaRPr lang="en-US" dirty="0"/>
-          </a:p>
-          <a:p>
-            <a:r>
-              <a:rPr lang="en-US" dirty="0"/>
+            <a:endParaRPr lang="en-US" dirty="0">
+              <a:latin typeface="Times New Roman" panose="02020603050405020304" pitchFamily="18" charset="0"/>
+              <a:cs typeface="Times New Roman" panose="02020603050405020304" pitchFamily="18" charset="0"/>
+            </a:endParaRPr>
+          </a:p>
+          <a:p>
+            <a:r>
+              <a:rPr lang="en-US" dirty="0">
+                <a:latin typeface="Times New Roman" panose="02020603050405020304" pitchFamily="18" charset="0"/>
+                <a:cs typeface="Times New Roman" panose="02020603050405020304" pitchFamily="18" charset="0"/>
+              </a:rPr>
               <a:t>Tab = Map</a:t>
             </a:r>
           </a:p>
         </p:txBody>
       </p:sp>
+      <p:pic>
+        <p:nvPicPr>
+          <p:cNvPr id="4" name="Picture 3">
+            <a:extLst>
+              <a:ext uri="{FF2B5EF4-FFF2-40B4-BE49-F238E27FC236}">
+                <a16:creationId xmlns:a16="http://schemas.microsoft.com/office/drawing/2014/main" id="{A0CA2CC7-9A59-E12F-775F-08CF51FDA3FF}"/>
+              </a:ext>
+            </a:extLst>
+          </p:cNvPr>
+          <p:cNvPicPr>
+            <a:picLocks noChangeAspect="1"/>
+          </p:cNvPicPr>
+          <p:nvPr/>
+        </p:nvPicPr>
+        <p:blipFill>
+          <a:blip r:embed="rId8">
+            <a:extLst>
+              <a:ext uri="{28A0092B-C50C-407E-A947-70E740481C1C}">
+                <a14:useLocalDpi xmlns:a14="http://schemas.microsoft.com/office/drawing/2010/main" val="0"/>
+              </a:ext>
+            </a:extLst>
+          </a:blip>
+          <a:stretch>
+            <a:fillRect/>
+          </a:stretch>
+        </p:blipFill>
+        <p:spPr>
+          <a:xfrm>
+            <a:off x="1125759" y="3662660"/>
+            <a:ext cx="480415" cy="180155"/>
+          </a:xfrm>
+          <a:prstGeom prst="rect">
+            <a:avLst/>
+          </a:prstGeom>
+        </p:spPr>
+      </p:pic>
     </p:spTree>
     <p:extLst>
       <p:ext uri="{BB962C8B-B14F-4D97-AF65-F5344CB8AC3E}">
@@ -5438,84 +6696,12 @@
           <a:chExt cx="0" cy="0"/>
         </a:xfrm>
       </p:grpSpPr>
-      <p:pic>
-        <p:nvPicPr>
-          <p:cNvPr id="70" name="Picture 69" descr="A picture containing text&#10;&#10;Description automatically generated">
-            <a:extLst>
-              <a:ext uri="{FF2B5EF4-FFF2-40B4-BE49-F238E27FC236}">
-                <a16:creationId xmlns:a16="http://schemas.microsoft.com/office/drawing/2014/main" id="{5627B069-4CF3-8894-0AF3-0CF21F59E850}"/>
-              </a:ext>
-            </a:extLst>
-          </p:cNvPr>
-          <p:cNvPicPr>
-            <a:picLocks noChangeAspect="1"/>
-          </p:cNvPicPr>
-          <p:nvPr/>
-        </p:nvPicPr>
-        <p:blipFill>
-          <a:blip r:embed="rId2">
-            <a:extLst>
-              <a:ext uri="{28A0092B-C50C-407E-A947-70E740481C1C}">
-                <a14:useLocalDpi xmlns:a14="http://schemas.microsoft.com/office/drawing/2010/main" val="0"/>
-              </a:ext>
-            </a:extLst>
-          </a:blip>
-          <a:stretch>
-            <a:fillRect/>
-          </a:stretch>
-        </p:blipFill>
-        <p:spPr>
-          <a:xfrm>
-            <a:off x="353071" y="3421366"/>
-            <a:ext cx="1085850" cy="1114425"/>
-          </a:xfrm>
-          <a:prstGeom prst="rect">
-            <a:avLst/>
-          </a:prstGeom>
-        </p:spPr>
-      </p:pic>
-      <p:pic>
-        <p:nvPicPr>
-          <p:cNvPr id="68" name="Picture 67" descr="Chart, histogram&#10;&#10;Description automatically generated">
-            <a:extLst>
-              <a:ext uri="{FF2B5EF4-FFF2-40B4-BE49-F238E27FC236}">
-                <a16:creationId xmlns:a16="http://schemas.microsoft.com/office/drawing/2014/main" id="{A6661141-28DD-99B5-C6CD-492AF21F34FC}"/>
-              </a:ext>
-            </a:extLst>
-          </p:cNvPr>
-          <p:cNvPicPr>
-            <a:picLocks noChangeAspect="1"/>
-          </p:cNvPicPr>
-          <p:nvPr/>
-        </p:nvPicPr>
-        <p:blipFill>
-          <a:blip r:embed="rId3">
-            <a:extLst>
-              <a:ext uri="{28A0092B-C50C-407E-A947-70E740481C1C}">
-                <a14:useLocalDpi xmlns:a14="http://schemas.microsoft.com/office/drawing/2010/main" val="0"/>
-              </a:ext>
-            </a:extLst>
-          </a:blip>
-          <a:stretch>
-            <a:fillRect/>
-          </a:stretch>
-        </p:blipFill>
-        <p:spPr>
-          <a:xfrm>
-            <a:off x="438796" y="4841128"/>
-            <a:ext cx="914400" cy="1114425"/>
-          </a:xfrm>
-          <a:prstGeom prst="rect">
-            <a:avLst/>
-          </a:prstGeom>
-        </p:spPr>
-      </p:pic>
-      <p:sp>
-        <p:nvSpPr>
-          <p:cNvPr id="42" name="Arrow: Down 41">
-            <a:extLst>
-              <a:ext uri="{FF2B5EF4-FFF2-40B4-BE49-F238E27FC236}">
-                <a16:creationId xmlns:a16="http://schemas.microsoft.com/office/drawing/2014/main" id="{E99080F4-7341-77B6-63D3-186982F57B76}"/>
+      <p:sp>
+        <p:nvSpPr>
+          <p:cNvPr id="16" name="Rectangle: Rounded Corners 15">
+            <a:extLst>
+              <a:ext uri="{FF2B5EF4-FFF2-40B4-BE49-F238E27FC236}">
+                <a16:creationId xmlns:a16="http://schemas.microsoft.com/office/drawing/2014/main" id="{6A61107F-D3C6-4F15-0AF8-04DFF68283A3}"/>
               </a:ext>
             </a:extLst>
           </p:cNvPr>
@@ -5523,7 +6709,200 @@
           <p:nvPr/>
         </p:nvSpPr>
         <p:spPr>
-          <a:xfrm rot="10800000">
+          <a:xfrm>
+            <a:off x="1549106" y="7540795"/>
+            <a:ext cx="4672193" cy="831978"/>
+          </a:xfrm>
+          <a:prstGeom prst="roundRect">
+            <a:avLst>
+              <a:gd name="adj" fmla="val 50000"/>
+            </a:avLst>
+          </a:prstGeom>
+        </p:spPr>
+        <p:style>
+          <a:lnRef idx="1">
+            <a:schemeClr val="accent1"/>
+          </a:lnRef>
+          <a:fillRef idx="3">
+            <a:schemeClr val="accent1"/>
+          </a:fillRef>
+          <a:effectRef idx="2">
+            <a:schemeClr val="accent1"/>
+          </a:effectRef>
+          <a:fontRef idx="minor">
+            <a:schemeClr val="lt1"/>
+          </a:fontRef>
+        </p:style>
+        <p:txBody>
+          <a:bodyPr rtlCol="0" anchor="ctr"/>
+          <a:lstStyle/>
+          <a:p>
+            <a:pPr algn="ctr"/>
+            <a:endParaRPr lang="en-US"/>
+          </a:p>
+        </p:txBody>
+      </p:sp>
+      <p:sp>
+        <p:nvSpPr>
+          <p:cNvPr id="12" name="Rectangle: Rounded Corners 11">
+            <a:extLst>
+              <a:ext uri="{FF2B5EF4-FFF2-40B4-BE49-F238E27FC236}">
+                <a16:creationId xmlns:a16="http://schemas.microsoft.com/office/drawing/2014/main" id="{F34A32B7-C20B-5A72-CF07-10AE2726576C}"/>
+              </a:ext>
+            </a:extLst>
+          </p:cNvPr>
+          <p:cNvSpPr/>
+          <p:nvPr/>
+        </p:nvSpPr>
+        <p:spPr>
+          <a:xfrm>
+            <a:off x="2313439" y="3660968"/>
+            <a:ext cx="4843773" cy="1054034"/>
+          </a:xfrm>
+          <a:prstGeom prst="roundRect">
+            <a:avLst>
+              <a:gd name="adj" fmla="val 50000"/>
+            </a:avLst>
+          </a:prstGeom>
+          <a:ln>
+            <a:noFill/>
+          </a:ln>
+        </p:spPr>
+        <p:style>
+          <a:lnRef idx="0">
+            <a:schemeClr val="accent1"/>
+          </a:lnRef>
+          <a:fillRef idx="3">
+            <a:schemeClr val="accent1"/>
+          </a:fillRef>
+          <a:effectRef idx="3">
+            <a:schemeClr val="accent1"/>
+          </a:effectRef>
+          <a:fontRef idx="minor">
+            <a:schemeClr val="lt1"/>
+          </a:fontRef>
+        </p:style>
+        <p:txBody>
+          <a:bodyPr rtlCol="0" anchor="ctr"/>
+          <a:lstStyle/>
+          <a:p>
+            <a:pPr algn="ctr"/>
+            <a:endParaRPr lang="en-US"/>
+          </a:p>
+        </p:txBody>
+      </p:sp>
+      <p:sp>
+        <p:nvSpPr>
+          <p:cNvPr id="13" name="Rectangle: Rounded Corners 12">
+            <a:extLst>
+              <a:ext uri="{FF2B5EF4-FFF2-40B4-BE49-F238E27FC236}">
+                <a16:creationId xmlns:a16="http://schemas.microsoft.com/office/drawing/2014/main" id="{1D6CFB87-C285-A639-8E97-3FF406B3682A}"/>
+              </a:ext>
+            </a:extLst>
+          </p:cNvPr>
+          <p:cNvSpPr/>
+          <p:nvPr/>
+        </p:nvSpPr>
+        <p:spPr>
+          <a:xfrm>
+            <a:off x="3016741" y="4880041"/>
+            <a:ext cx="4843773" cy="1054034"/>
+          </a:xfrm>
+          <a:prstGeom prst="roundRect">
+            <a:avLst>
+              <a:gd name="adj" fmla="val 50000"/>
+            </a:avLst>
+          </a:prstGeom>
+          <a:ln>
+            <a:noFill/>
+          </a:ln>
+        </p:spPr>
+        <p:style>
+          <a:lnRef idx="0">
+            <a:schemeClr val="accent1"/>
+          </a:lnRef>
+          <a:fillRef idx="3">
+            <a:schemeClr val="accent1"/>
+          </a:fillRef>
+          <a:effectRef idx="3">
+            <a:schemeClr val="accent1"/>
+          </a:effectRef>
+          <a:fontRef idx="minor">
+            <a:schemeClr val="lt1"/>
+          </a:fontRef>
+        </p:style>
+        <p:txBody>
+          <a:bodyPr rtlCol="0" anchor="ctr"/>
+          <a:lstStyle/>
+          <a:p>
+            <a:pPr algn="ctr"/>
+            <a:endParaRPr lang="en-US"/>
+          </a:p>
+        </p:txBody>
+      </p:sp>
+      <p:sp>
+        <p:nvSpPr>
+          <p:cNvPr id="14" name="Rectangle: Rounded Corners 13">
+            <a:extLst>
+              <a:ext uri="{FF2B5EF4-FFF2-40B4-BE49-F238E27FC236}">
+                <a16:creationId xmlns:a16="http://schemas.microsoft.com/office/drawing/2014/main" id="{8B744AEF-C837-0711-E04C-B6EE975AF4D6}"/>
+              </a:ext>
+            </a:extLst>
+          </p:cNvPr>
+          <p:cNvSpPr/>
+          <p:nvPr/>
+        </p:nvSpPr>
+        <p:spPr>
+          <a:xfrm>
+            <a:off x="2584379" y="6099456"/>
+            <a:ext cx="4843773" cy="1054034"/>
+          </a:xfrm>
+          <a:prstGeom prst="roundRect">
+            <a:avLst>
+              <a:gd name="adj" fmla="val 50000"/>
+            </a:avLst>
+          </a:prstGeom>
+          <a:ln>
+            <a:noFill/>
+          </a:ln>
+        </p:spPr>
+        <p:style>
+          <a:lnRef idx="0">
+            <a:schemeClr val="accent1"/>
+          </a:lnRef>
+          <a:fillRef idx="3">
+            <a:schemeClr val="accent1"/>
+          </a:fillRef>
+          <a:effectRef idx="3">
+            <a:schemeClr val="accent1"/>
+          </a:effectRef>
+          <a:fontRef idx="minor">
+            <a:schemeClr val="lt1"/>
+          </a:fontRef>
+        </p:style>
+        <p:txBody>
+          <a:bodyPr rtlCol="0" anchor="ctr"/>
+          <a:lstStyle/>
+          <a:p>
+            <a:pPr algn="ctr"/>
+            <a:endParaRPr lang="en-US" dirty="0"/>
+          </a:p>
+        </p:txBody>
+      </p:sp>
+      <p:sp>
+        <p:nvSpPr>
+          <p:cNvPr id="42" name="Arrow: Down 41">
+            <a:extLst>
+              <a:ext uri="{FF2B5EF4-FFF2-40B4-BE49-F238E27FC236}">
+                <a16:creationId xmlns:a16="http://schemas.microsoft.com/office/drawing/2014/main" id="{E99080F4-7341-77B6-63D3-186982F57B76}"/>
+              </a:ext>
+            </a:extLst>
+          </p:cNvPr>
+          <p:cNvSpPr/>
+          <p:nvPr/>
+        </p:nvSpPr>
+        <p:spPr>
+          <a:xfrm rot="10800000" flipH="1">
             <a:off x="2998554" y="1533227"/>
             <a:ext cx="886649" cy="1636199"/>
           </a:xfrm>
@@ -5559,48 +6938,12 @@
           </a:p>
         </p:txBody>
       </p:sp>
-      <p:pic>
-        <p:nvPicPr>
-          <p:cNvPr id="36" name="Picture 35" descr="A picture containing text&#10;&#10;Description automatically generated">
-            <a:extLst>
-              <a:ext uri="{FF2B5EF4-FFF2-40B4-BE49-F238E27FC236}">
-                <a16:creationId xmlns:a16="http://schemas.microsoft.com/office/drawing/2014/main" id="{E1EA742A-0A00-AC3F-8B4D-D3BEA640D5C0}"/>
-              </a:ext>
-            </a:extLst>
-          </p:cNvPr>
-          <p:cNvPicPr>
-            <a:picLocks noChangeAspect="1"/>
-          </p:cNvPicPr>
-          <p:nvPr/>
-        </p:nvPicPr>
-        <p:blipFill>
-          <a:blip r:embed="rId4">
-            <a:extLst>
-              <a:ext uri="{28A0092B-C50C-407E-A947-70E740481C1C}">
-                <a14:useLocalDpi xmlns:a14="http://schemas.microsoft.com/office/drawing/2010/main" val="0"/>
-              </a:ext>
-            </a:extLst>
-          </a:blip>
-          <a:stretch>
-            <a:fillRect/>
-          </a:stretch>
-        </p:blipFill>
-        <p:spPr>
-          <a:xfrm>
-            <a:off x="-763595" y="5704696"/>
-            <a:ext cx="3246768" cy="1665009"/>
-          </a:xfrm>
-          <a:prstGeom prst="rect">
-            <a:avLst/>
-          </a:prstGeom>
-        </p:spPr>
-      </p:pic>
-      <p:sp>
-        <p:nvSpPr>
-          <p:cNvPr id="50" name="TextBox 49">
-            <a:extLst>
-              <a:ext uri="{FF2B5EF4-FFF2-40B4-BE49-F238E27FC236}">
-                <a16:creationId xmlns:a16="http://schemas.microsoft.com/office/drawing/2014/main" id="{AA5CB5F5-7C1A-59D2-D919-C4623F776D23}"/>
+      <p:sp>
+        <p:nvSpPr>
+          <p:cNvPr id="56" name="TextBox 55">
+            <a:extLst>
+              <a:ext uri="{FF2B5EF4-FFF2-40B4-BE49-F238E27FC236}">
+                <a16:creationId xmlns:a16="http://schemas.microsoft.com/office/drawing/2014/main" id="{C1CEE3DB-1EF4-80C5-B1B2-27EC54308753}"/>
               </a:ext>
             </a:extLst>
           </p:cNvPr>
@@ -5608,9 +6951,9 @@
           <p:nvPr/>
         </p:nvSpPr>
         <p:spPr>
-          <a:xfrm>
-            <a:off x="243840" y="395914"/>
-            <a:ext cx="4718304" cy="369332"/>
+          <a:xfrm flipH="1">
+            <a:off x="85053" y="1594776"/>
+            <a:ext cx="2191286" cy="923330"/>
           </a:xfrm>
           <a:prstGeom prst="rect">
             <a:avLst/>
@@ -5623,19 +6966,23 @@
           </a:bodyPr>
           <a:lstStyle/>
           <a:p>
-            <a:r>
-              <a:rPr lang="en-US" dirty="0"/>
-              <a:t>Controls</a:t>
-            </a:r>
-          </a:p>
-        </p:txBody>
-      </p:sp>
-      <p:sp>
-        <p:nvSpPr>
-          <p:cNvPr id="56" name="TextBox 55">
-            <a:extLst>
-              <a:ext uri="{FF2B5EF4-FFF2-40B4-BE49-F238E27FC236}">
-                <a16:creationId xmlns:a16="http://schemas.microsoft.com/office/drawing/2014/main" id="{C1CEE3DB-1EF4-80C5-B1B2-27EC54308753}"/>
+            <a:pPr algn="ctr"/>
+            <a:r>
+              <a:rPr lang="en-US" dirty="0">
+                <a:latin typeface="Times New Roman" panose="02020603050405020304" pitchFamily="18" charset="0"/>
+                <a:cs typeface="Times New Roman" panose="02020603050405020304" pitchFamily="18" charset="0"/>
+              </a:rPr>
+              <a:t>These Controls are for when you're using a controller</a:t>
+            </a:r>
+          </a:p>
+        </p:txBody>
+      </p:sp>
+      <p:sp>
+        <p:nvSpPr>
+          <p:cNvPr id="57" name="TextBox 56">
+            <a:extLst>
+              <a:ext uri="{FF2B5EF4-FFF2-40B4-BE49-F238E27FC236}">
+                <a16:creationId xmlns:a16="http://schemas.microsoft.com/office/drawing/2014/main" id="{400A0492-7455-8806-A5A9-5990F9EB6778}"/>
               </a:ext>
             </a:extLst>
           </p:cNvPr>
@@ -5643,9 +6990,9 @@
           <p:nvPr/>
         </p:nvSpPr>
         <p:spPr>
-          <a:xfrm>
-            <a:off x="85053" y="1594776"/>
-            <a:ext cx="2191286" cy="923330"/>
+          <a:xfrm flipH="1">
+            <a:off x="3989663" y="6098133"/>
+            <a:ext cx="1668651" cy="923330"/>
           </a:xfrm>
           <a:prstGeom prst="rect">
             <a:avLst/>
@@ -5660,18 +7007,21 @@
           <a:p>
             <a:pPr algn="ctr"/>
             <a:r>
-              <a:rPr lang="en-US" dirty="0"/>
-              <a:t>These Controls are for when you're using a controller</a:t>
-            </a:r>
-          </a:p>
-        </p:txBody>
-      </p:sp>
-      <p:sp>
-        <p:nvSpPr>
-          <p:cNvPr id="57" name="TextBox 56">
-            <a:extLst>
-              <a:ext uri="{FF2B5EF4-FFF2-40B4-BE49-F238E27FC236}">
-                <a16:creationId xmlns:a16="http://schemas.microsoft.com/office/drawing/2014/main" id="{400A0492-7455-8806-A5A9-5990F9EB6778}"/>
+              <a:rPr lang="en-US" dirty="0">
+                <a:latin typeface="Times New Roman" panose="02020603050405020304" pitchFamily="18" charset="0"/>
+                <a:cs typeface="Times New Roman" panose="02020603050405020304" pitchFamily="18" charset="0"/>
+              </a:rPr>
+              <a:t>A or B buttons (south and west buttons)</a:t>
+            </a:r>
+          </a:p>
+        </p:txBody>
+      </p:sp>
+      <p:sp>
+        <p:nvSpPr>
+          <p:cNvPr id="58" name="TextBox 57">
+            <a:extLst>
+              <a:ext uri="{FF2B5EF4-FFF2-40B4-BE49-F238E27FC236}">
+                <a16:creationId xmlns:a16="http://schemas.microsoft.com/office/drawing/2014/main" id="{B9CC29EE-5EF4-4BE4-93BD-88D22ACB52C3}"/>
               </a:ext>
             </a:extLst>
           </p:cNvPr>
@@ -5679,9 +7029,9 @@
           <p:nvPr/>
         </p:nvSpPr>
         <p:spPr>
-          <a:xfrm>
-            <a:off x="1269945" y="6077717"/>
-            <a:ext cx="1668651" cy="923330"/>
+          <a:xfrm flipH="1">
+            <a:off x="2584379" y="6348758"/>
+            <a:ext cx="1572368" cy="369332"/>
           </a:xfrm>
           <a:prstGeom prst="rect">
             <a:avLst/>
@@ -5696,18 +7046,21 @@
           <a:p>
             <a:pPr algn="ctr"/>
             <a:r>
-              <a:rPr lang="en-US" dirty="0"/>
-              <a:t>A or B buttons (south and west buttons)</a:t>
-            </a:r>
-          </a:p>
-        </p:txBody>
-      </p:sp>
-      <p:sp>
-        <p:nvSpPr>
-          <p:cNvPr id="58" name="TextBox 57">
-            <a:extLst>
-              <a:ext uri="{FF2B5EF4-FFF2-40B4-BE49-F238E27FC236}">
-                <a16:creationId xmlns:a16="http://schemas.microsoft.com/office/drawing/2014/main" id="{B9CC29EE-5EF4-4BE4-93BD-88D22ACB52C3}"/>
+              <a:rPr lang="en-US" dirty="0">
+                <a:latin typeface="Times New Roman" panose="02020603050405020304" pitchFamily="18" charset="0"/>
+                <a:cs typeface="Times New Roman" panose="02020603050405020304" pitchFamily="18" charset="0"/>
+              </a:rPr>
+              <a:t>Attack!   =</a:t>
+            </a:r>
+          </a:p>
+        </p:txBody>
+      </p:sp>
+      <p:sp>
+        <p:nvSpPr>
+          <p:cNvPr id="60" name="TextBox 59">
+            <a:extLst>
+              <a:ext uri="{FF2B5EF4-FFF2-40B4-BE49-F238E27FC236}">
+                <a16:creationId xmlns:a16="http://schemas.microsoft.com/office/drawing/2014/main" id="{A2844563-DECF-2C56-8C7D-1E7D8C319E43}"/>
               </a:ext>
             </a:extLst>
           </p:cNvPr>
@@ -5715,9 +7068,9 @@
           <p:nvPr/>
         </p:nvSpPr>
         <p:spPr>
-          <a:xfrm>
-            <a:off x="2755048" y="6352534"/>
-            <a:ext cx="1572368" cy="369332"/>
+          <a:xfrm flipH="1">
+            <a:off x="2584379" y="3726149"/>
+            <a:ext cx="1572368" cy="923330"/>
           </a:xfrm>
           <a:prstGeom prst="rect">
             <a:avLst/>
@@ -5732,18 +7085,21 @@
           <a:p>
             <a:pPr algn="ctr"/>
             <a:r>
-              <a:rPr lang="en-US" dirty="0"/>
-              <a:t>=     Attack!</a:t>
-            </a:r>
-          </a:p>
-        </p:txBody>
-      </p:sp>
-      <p:sp>
-        <p:nvSpPr>
-          <p:cNvPr id="60" name="TextBox 59">
-            <a:extLst>
-              <a:ext uri="{FF2B5EF4-FFF2-40B4-BE49-F238E27FC236}">
-                <a16:creationId xmlns:a16="http://schemas.microsoft.com/office/drawing/2014/main" id="{A2844563-DECF-2C56-8C7D-1E7D8C319E43}"/>
+              <a:rPr lang="en-US" dirty="0">
+                <a:latin typeface="Times New Roman" panose="02020603050405020304" pitchFamily="18" charset="0"/>
+                <a:cs typeface="Times New Roman" panose="02020603050405020304" pitchFamily="18" charset="0"/>
+              </a:rPr>
+              <a:t>Pick up an item/ throw = the item</a:t>
+            </a:r>
+          </a:p>
+        </p:txBody>
+      </p:sp>
+      <p:sp>
+        <p:nvSpPr>
+          <p:cNvPr id="63" name="TextBox 62">
+            <a:extLst>
+              <a:ext uri="{FF2B5EF4-FFF2-40B4-BE49-F238E27FC236}">
+                <a16:creationId xmlns:a16="http://schemas.microsoft.com/office/drawing/2014/main" id="{035F981A-E05A-CF49-3604-288F0CD11EDC}"/>
               </a:ext>
             </a:extLst>
           </p:cNvPr>
@@ -5751,9 +7107,9 @@
           <p:nvPr/>
         </p:nvSpPr>
         <p:spPr>
-          <a:xfrm>
-            <a:off x="3357291" y="3662417"/>
-            <a:ext cx="1572368" cy="923330"/>
+          <a:xfrm flipH="1">
+            <a:off x="4021616" y="3838190"/>
+            <a:ext cx="2191286" cy="646331"/>
           </a:xfrm>
           <a:prstGeom prst="rect">
             <a:avLst/>
@@ -5766,20 +7122,31 @@
           </a:bodyPr>
           <a:lstStyle/>
           <a:p>
-            <a:pPr algn="ctr"/>
-            <a:r>
-              <a:rPr lang="en-US" dirty="0"/>
-              <a:t>Pick up an item/ throw the item</a:t>
-            </a:r>
-          </a:p>
-        </p:txBody>
-      </p:sp>
-      <p:sp>
-        <p:nvSpPr>
-          <p:cNvPr id="63" name="TextBox 62">
-            <a:extLst>
-              <a:ext uri="{FF2B5EF4-FFF2-40B4-BE49-F238E27FC236}">
-                <a16:creationId xmlns:a16="http://schemas.microsoft.com/office/drawing/2014/main" id="{035F981A-E05A-CF49-3604-288F0CD11EDC}"/>
+            <a:r>
+              <a:rPr lang="en-US" dirty="0">
+                <a:latin typeface="Times New Roman" panose="02020603050405020304" pitchFamily="18" charset="0"/>
+                <a:cs typeface="Times New Roman" panose="02020603050405020304" pitchFamily="18" charset="0"/>
+              </a:rPr>
+              <a:t>Shoulder buttons</a:t>
+            </a:r>
+          </a:p>
+          <a:p>
+            <a:r>
+              <a:rPr lang="en-US" dirty="0">
+                <a:latin typeface="Times New Roman" panose="02020603050405020304" pitchFamily="18" charset="0"/>
+                <a:cs typeface="Times New Roman" panose="02020603050405020304" pitchFamily="18" charset="0"/>
+              </a:rPr>
+              <a:t>    (not triggers!)</a:t>
+            </a:r>
+          </a:p>
+        </p:txBody>
+      </p:sp>
+      <p:sp>
+        <p:nvSpPr>
+          <p:cNvPr id="64" name="TextBox 63">
+            <a:extLst>
+              <a:ext uri="{FF2B5EF4-FFF2-40B4-BE49-F238E27FC236}">
+                <a16:creationId xmlns:a16="http://schemas.microsoft.com/office/drawing/2014/main" id="{3D179706-8B04-7F10-20B9-5B99292ACD67}"/>
               </a:ext>
             </a:extLst>
           </p:cNvPr>
@@ -5787,9 +7154,9 @@
           <p:nvPr/>
         </p:nvSpPr>
         <p:spPr>
-          <a:xfrm>
-            <a:off x="1444235" y="3837192"/>
-            <a:ext cx="2191286" cy="646331"/>
+          <a:xfrm flipH="1">
+            <a:off x="3343129" y="5045946"/>
+            <a:ext cx="2378079" cy="646331"/>
           </a:xfrm>
           <a:prstGeom prst="rect">
             <a:avLst/>
@@ -5803,48 +7170,10 @@
           <a:lstStyle/>
           <a:p>
             <a:r>
-              <a:rPr lang="en-US" dirty="0"/>
-              <a:t>Shoulder buttons   =</a:t>
-            </a:r>
-          </a:p>
-          <a:p>
-            <a:r>
-              <a:rPr lang="en-US" dirty="0"/>
-              <a:t>    (not triggers!)</a:t>
-            </a:r>
-          </a:p>
-        </p:txBody>
-      </p:sp>
-      <p:sp>
-        <p:nvSpPr>
-          <p:cNvPr id="64" name="TextBox 63">
-            <a:extLst>
-              <a:ext uri="{FF2B5EF4-FFF2-40B4-BE49-F238E27FC236}">
-                <a16:creationId xmlns:a16="http://schemas.microsoft.com/office/drawing/2014/main" id="{3D179706-8B04-7F10-20B9-5B99292ACD67}"/>
-              </a:ext>
-            </a:extLst>
-          </p:cNvPr>
-          <p:cNvSpPr txBox="1"/>
-          <p:nvPr/>
-        </p:nvSpPr>
-        <p:spPr>
-          <a:xfrm>
-            <a:off x="1438920" y="5162052"/>
-            <a:ext cx="3905811" cy="369332"/>
-          </a:xfrm>
-          <a:prstGeom prst="rect">
-            <a:avLst/>
-          </a:prstGeom>
-          <a:noFill/>
-        </p:spPr>
-        <p:txBody>
-          <a:bodyPr wrap="square" rtlCol="0">
-            <a:spAutoFit/>
-          </a:bodyPr>
-          <a:lstStyle/>
-          <a:p>
-            <a:r>
-              <a:rPr lang="en-US" dirty="0"/>
+              <a:rPr lang="en-US" dirty="0">
+                <a:latin typeface="Times New Roman" panose="02020603050405020304" pitchFamily="18" charset="0"/>
+                <a:cs typeface="Times New Roman" panose="02020603050405020304" pitchFamily="18" charset="0"/>
+              </a:rPr>
               <a:t>X or Y to Dash! (north and east buttons)</a:t>
             </a:r>
           </a:p>
@@ -5961,7 +7290,7 @@
           <p:nvPr/>
         </p:nvSpPr>
         <p:spPr>
-          <a:xfrm rot="10800000" flipV="1">
+          <a:xfrm rot="10800000" flipH="1" flipV="1">
             <a:off x="2992864" y="1906435"/>
             <a:ext cx="886649" cy="1636199"/>
           </a:xfrm>
@@ -6012,7 +7341,7 @@
           <p:nvPr/>
         </p:nvPicPr>
         <p:blipFill>
-          <a:blip r:embed="rId5">
+          <a:blip r:embed="rId2">
             <a:extLst>
               <a:ext uri="{28A0092B-C50C-407E-A947-70E740481C1C}">
                 <a14:useLocalDpi xmlns:a14="http://schemas.microsoft.com/office/drawing/2010/main" val="0"/>
@@ -6024,8 +7353,8 @@
           </a:stretch>
         </p:blipFill>
         <p:spPr>
-          <a:xfrm>
-            <a:off x="3165806" y="2893965"/>
+          <a:xfrm flipH="1">
+            <a:off x="3209523" y="2892445"/>
             <a:ext cx="553915" cy="823865"/>
           </a:xfrm>
           <a:prstGeom prst="rect">
@@ -6039,6 +7368,310 @@
             <a:extLst>
               <a:ext uri="{FF2B5EF4-FFF2-40B4-BE49-F238E27FC236}">
                 <a16:creationId xmlns:a16="http://schemas.microsoft.com/office/drawing/2014/main" id="{66883F91-0E34-80D1-06BA-ADA95BACB723}"/>
+              </a:ext>
+            </a:extLst>
+          </p:cNvPr>
+          <p:cNvPicPr>
+            <a:picLocks noChangeAspect="1"/>
+          </p:cNvPicPr>
+          <p:nvPr/>
+        </p:nvPicPr>
+        <p:blipFill>
+          <a:blip r:embed="rId3">
+            <a:extLst>
+              <a:ext uri="{28A0092B-C50C-407E-A947-70E740481C1C}">
+                <a14:useLocalDpi xmlns:a14="http://schemas.microsoft.com/office/drawing/2010/main" val="0"/>
+              </a:ext>
+            </a:extLst>
+          </a:blip>
+          <a:stretch>
+            <a:fillRect/>
+          </a:stretch>
+        </p:blipFill>
+        <p:spPr>
+          <a:xfrm flipH="1">
+            <a:off x="2384681" y="2184217"/>
+            <a:ext cx="553915" cy="675084"/>
+          </a:xfrm>
+          <a:prstGeom prst="rect">
+            <a:avLst/>
+          </a:prstGeom>
+        </p:spPr>
+      </p:pic>
+      <p:pic>
+        <p:nvPicPr>
+          <p:cNvPr id="38" name="Picture 37" descr="Logo&#10;&#10;Description automatically generated with medium confidence">
+            <a:extLst>
+              <a:ext uri="{FF2B5EF4-FFF2-40B4-BE49-F238E27FC236}">
+                <a16:creationId xmlns:a16="http://schemas.microsoft.com/office/drawing/2014/main" id="{0675E59E-D266-7B7B-A057-180A56773EF7}"/>
+              </a:ext>
+            </a:extLst>
+          </p:cNvPr>
+          <p:cNvPicPr>
+            <a:picLocks noChangeAspect="1"/>
+          </p:cNvPicPr>
+          <p:nvPr/>
+        </p:nvPicPr>
+        <p:blipFill>
+          <a:blip r:embed="rId4">
+            <a:extLst>
+              <a:ext uri="{28A0092B-C50C-407E-A947-70E740481C1C}">
+                <a14:useLocalDpi xmlns:a14="http://schemas.microsoft.com/office/drawing/2010/main" val="0"/>
+              </a:ext>
+            </a:extLst>
+          </a:blip>
+          <a:stretch>
+            <a:fillRect/>
+          </a:stretch>
+        </p:blipFill>
+        <p:spPr>
+          <a:xfrm flipH="1">
+            <a:off x="3165805" y="1358708"/>
+            <a:ext cx="553915" cy="675084"/>
+          </a:xfrm>
+          <a:prstGeom prst="rect">
+            <a:avLst/>
+          </a:prstGeom>
+        </p:spPr>
+      </p:pic>
+      <p:pic>
+        <p:nvPicPr>
+          <p:cNvPr id="47" name="Picture 46" descr="A picture containing chart&#10;&#10;Description automatically generated">
+            <a:extLst>
+              <a:ext uri="{FF2B5EF4-FFF2-40B4-BE49-F238E27FC236}">
+                <a16:creationId xmlns:a16="http://schemas.microsoft.com/office/drawing/2014/main" id="{49A76444-AF8A-2151-ED6D-22B08BE7CF9D}"/>
+              </a:ext>
+            </a:extLst>
+          </p:cNvPr>
+          <p:cNvPicPr>
+            <a:picLocks noChangeAspect="1"/>
+          </p:cNvPicPr>
+          <p:nvPr/>
+        </p:nvPicPr>
+        <p:blipFill>
+          <a:blip r:embed="rId3">
+            <a:extLst>
+              <a:ext uri="{28A0092B-C50C-407E-A947-70E740481C1C}">
+                <a14:useLocalDpi xmlns:a14="http://schemas.microsoft.com/office/drawing/2010/main" val="0"/>
+              </a:ext>
+            </a:extLst>
+          </a:blip>
+          <a:stretch>
+            <a:fillRect/>
+          </a:stretch>
+        </p:blipFill>
+        <p:spPr>
+          <a:xfrm>
+            <a:off x="4041589" y="2166183"/>
+            <a:ext cx="553915" cy="675084"/>
+          </a:xfrm>
+          <a:prstGeom prst="rect">
+            <a:avLst/>
+          </a:prstGeom>
+        </p:spPr>
+      </p:pic>
+      <p:sp>
+        <p:nvSpPr>
+          <p:cNvPr id="3" name="TextBox 2">
+            <a:extLst>
+              <a:ext uri="{FF2B5EF4-FFF2-40B4-BE49-F238E27FC236}">
+                <a16:creationId xmlns:a16="http://schemas.microsoft.com/office/drawing/2014/main" id="{80FEFECF-586B-045B-3270-74A4243DC962}"/>
+              </a:ext>
+            </a:extLst>
+          </p:cNvPr>
+          <p:cNvSpPr txBox="1"/>
+          <p:nvPr/>
+        </p:nvSpPr>
+        <p:spPr>
+          <a:xfrm flipH="1">
+            <a:off x="4096197" y="1385054"/>
+            <a:ext cx="1726885" cy="646331"/>
+          </a:xfrm>
+          <a:prstGeom prst="rect">
+            <a:avLst/>
+          </a:prstGeom>
+          <a:noFill/>
+        </p:spPr>
+        <p:txBody>
+          <a:bodyPr wrap="square" rtlCol="0">
+            <a:spAutoFit/>
+          </a:bodyPr>
+          <a:lstStyle/>
+          <a:p>
+            <a:r>
+              <a:rPr lang="en-US" dirty="0">
+                <a:latin typeface="Times New Roman" panose="02020603050405020304" pitchFamily="18" charset="0"/>
+                <a:cs typeface="Times New Roman" panose="02020603050405020304" pitchFamily="18" charset="0"/>
+              </a:rPr>
+              <a:t>Left joystick for movement</a:t>
+            </a:r>
+          </a:p>
+        </p:txBody>
+      </p:sp>
+      <p:sp>
+        <p:nvSpPr>
+          <p:cNvPr id="4" name="TextBox 3">
+            <a:extLst>
+              <a:ext uri="{FF2B5EF4-FFF2-40B4-BE49-F238E27FC236}">
+                <a16:creationId xmlns:a16="http://schemas.microsoft.com/office/drawing/2014/main" id="{3559E171-9AC3-2489-84AE-28BAECEABF09}"/>
+              </a:ext>
+            </a:extLst>
+          </p:cNvPr>
+          <p:cNvSpPr txBox="1"/>
+          <p:nvPr/>
+        </p:nvSpPr>
+        <p:spPr>
+          <a:xfrm flipH="1">
+            <a:off x="3343129" y="7521841"/>
+            <a:ext cx="2918495" cy="923330"/>
+          </a:xfrm>
+          <a:prstGeom prst="rect">
+            <a:avLst/>
+          </a:prstGeom>
+          <a:noFill/>
+        </p:spPr>
+        <p:txBody>
+          <a:bodyPr wrap="square" rtlCol="0">
+            <a:spAutoFit/>
+          </a:bodyPr>
+          <a:lstStyle/>
+          <a:p>
+            <a:r>
+              <a:rPr lang="en-US" dirty="0">
+                <a:latin typeface="Times New Roman" panose="02020603050405020304" pitchFamily="18" charset="0"/>
+                <a:cs typeface="Times New Roman" panose="02020603050405020304" pitchFamily="18" charset="0"/>
+              </a:rPr>
+              <a:t>Plus (switch controller)</a:t>
+            </a:r>
+          </a:p>
+          <a:p>
+            <a:r>
+              <a:rPr lang="en-US" dirty="0">
+                <a:latin typeface="Times New Roman" panose="02020603050405020304" pitchFamily="18" charset="0"/>
+                <a:cs typeface="Times New Roman" panose="02020603050405020304" pitchFamily="18" charset="0"/>
+              </a:rPr>
+              <a:t>Start (</a:t>
+            </a:r>
+            <a:r>
+              <a:rPr lang="en-US" dirty="0" err="1">
+                <a:latin typeface="Times New Roman" panose="02020603050405020304" pitchFamily="18" charset="0"/>
+                <a:cs typeface="Times New Roman" panose="02020603050405020304" pitchFamily="18" charset="0"/>
+              </a:rPr>
+              <a:t>xbox</a:t>
+            </a:r>
+            <a:r>
+              <a:rPr lang="en-US" dirty="0">
+                <a:latin typeface="Times New Roman" panose="02020603050405020304" pitchFamily="18" charset="0"/>
+                <a:cs typeface="Times New Roman" panose="02020603050405020304" pitchFamily="18" charset="0"/>
+              </a:rPr>
+              <a:t>)</a:t>
+            </a:r>
+          </a:p>
+          <a:p>
+            <a:r>
+              <a:rPr lang="en-US" dirty="0">
+                <a:latin typeface="Times New Roman" panose="02020603050405020304" pitchFamily="18" charset="0"/>
+                <a:cs typeface="Times New Roman" panose="02020603050405020304" pitchFamily="18" charset="0"/>
+              </a:rPr>
+              <a:t>Pause/Options (</a:t>
+            </a:r>
+            <a:r>
+              <a:rPr lang="en-US" dirty="0" err="1">
+                <a:latin typeface="Times New Roman" panose="02020603050405020304" pitchFamily="18" charset="0"/>
+                <a:cs typeface="Times New Roman" panose="02020603050405020304" pitchFamily="18" charset="0"/>
+              </a:rPr>
+              <a:t>playstation</a:t>
+            </a:r>
+            <a:r>
+              <a:rPr lang="en-US" dirty="0">
+                <a:latin typeface="Times New Roman" panose="02020603050405020304" pitchFamily="18" charset="0"/>
+                <a:cs typeface="Times New Roman" panose="02020603050405020304" pitchFamily="18" charset="0"/>
+              </a:rPr>
+              <a:t>)</a:t>
+            </a:r>
+          </a:p>
+        </p:txBody>
+      </p:sp>
+      <p:sp>
+        <p:nvSpPr>
+          <p:cNvPr id="5" name="TextBox 4">
+            <a:extLst>
+              <a:ext uri="{FF2B5EF4-FFF2-40B4-BE49-F238E27FC236}">
+                <a16:creationId xmlns:a16="http://schemas.microsoft.com/office/drawing/2014/main" id="{F4D45BA0-4DAF-01DD-6149-F06CAB651655}"/>
+              </a:ext>
+            </a:extLst>
+          </p:cNvPr>
+          <p:cNvSpPr txBox="1"/>
+          <p:nvPr/>
+        </p:nvSpPr>
+        <p:spPr>
+          <a:xfrm flipH="1">
+            <a:off x="1725996" y="7798840"/>
+            <a:ext cx="1716766" cy="369332"/>
+          </a:xfrm>
+          <a:prstGeom prst="rect">
+            <a:avLst/>
+          </a:prstGeom>
+          <a:noFill/>
+        </p:spPr>
+        <p:txBody>
+          <a:bodyPr wrap="square" rtlCol="0">
+            <a:spAutoFit/>
+          </a:bodyPr>
+          <a:lstStyle/>
+          <a:p>
+            <a:r>
+              <a:rPr lang="en-US" dirty="0">
+                <a:latin typeface="Times New Roman" panose="02020603050405020304" pitchFamily="18" charset="0"/>
+                <a:cs typeface="Times New Roman" panose="02020603050405020304" pitchFamily="18" charset="0"/>
+              </a:rPr>
+              <a:t>Pause Menu =</a:t>
+            </a:r>
+          </a:p>
+        </p:txBody>
+      </p:sp>
+      <p:pic>
+        <p:nvPicPr>
+          <p:cNvPr id="7" name="Picture 6" descr="A picture containing text&#10;&#10;Description automatically generated">
+            <a:extLst>
+              <a:ext uri="{FF2B5EF4-FFF2-40B4-BE49-F238E27FC236}">
+                <a16:creationId xmlns:a16="http://schemas.microsoft.com/office/drawing/2014/main" id="{C55ABB58-D974-C27C-51F7-EFE0F1ED6B44}"/>
+              </a:ext>
+            </a:extLst>
+          </p:cNvPr>
+          <p:cNvPicPr>
+            <a:picLocks noChangeAspect="1"/>
+          </p:cNvPicPr>
+          <p:nvPr/>
+        </p:nvPicPr>
+        <p:blipFill>
+          <a:blip r:embed="rId5">
+            <a:extLst>
+              <a:ext uri="{28A0092B-C50C-407E-A947-70E740481C1C}">
+                <a14:useLocalDpi xmlns:a14="http://schemas.microsoft.com/office/drawing/2010/main" val="0"/>
+              </a:ext>
+            </a:extLst>
+          </a:blip>
+          <a:stretch>
+            <a:fillRect/>
+          </a:stretch>
+        </p:blipFill>
+        <p:spPr>
+          <a:xfrm flipH="1">
+            <a:off x="5768696" y="3517065"/>
+            <a:ext cx="1085850" cy="1114425"/>
+          </a:xfrm>
+          <a:prstGeom prst="rect">
+            <a:avLst/>
+          </a:prstGeom>
+        </p:spPr>
+      </p:pic>
+      <p:pic>
+        <p:nvPicPr>
+          <p:cNvPr id="8" name="Picture 7" descr="Chart, histogram&#10;&#10;Description automatically generated">
+            <a:extLst>
+              <a:ext uri="{FF2B5EF4-FFF2-40B4-BE49-F238E27FC236}">
+                <a16:creationId xmlns:a16="http://schemas.microsoft.com/office/drawing/2014/main" id="{40639287-BF63-3FAB-6F39-8BB03F9F9C25}"/>
               </a:ext>
             </a:extLst>
           </p:cNvPr>
@@ -6061,8 +7694,8 @@
         </p:blipFill>
         <p:spPr>
           <a:xfrm flipH="1">
-            <a:off x="2384681" y="2184217"/>
-            <a:ext cx="553915" cy="675084"/>
+            <a:off x="5397221" y="4841128"/>
+            <a:ext cx="914400" cy="1114425"/>
           </a:xfrm>
           <a:prstGeom prst="rect">
             <a:avLst/>
@@ -6071,10 +7704,10 @@
       </p:pic>
       <p:pic>
         <p:nvPicPr>
-          <p:cNvPr id="38" name="Picture 37" descr="Logo&#10;&#10;Description automatically generated with medium confidence">
-            <a:extLst>
-              <a:ext uri="{FF2B5EF4-FFF2-40B4-BE49-F238E27FC236}">
-                <a16:creationId xmlns:a16="http://schemas.microsoft.com/office/drawing/2014/main" id="{0675E59E-D266-7B7B-A057-180A56773EF7}"/>
+          <p:cNvPr id="9" name="Picture 8" descr="A picture containing text&#10;&#10;Description automatically generated">
+            <a:extLst>
+              <a:ext uri="{FF2B5EF4-FFF2-40B4-BE49-F238E27FC236}">
+                <a16:creationId xmlns:a16="http://schemas.microsoft.com/office/drawing/2014/main" id="{9C452E3F-4C20-68ED-BE81-DC087A2D0336}"/>
               </a:ext>
             </a:extLst>
           </p:cNvPr>
@@ -6096,57 +7729,21 @@
           </a:stretch>
         </p:blipFill>
         <p:spPr>
-          <a:xfrm>
-            <a:off x="3165805" y="1358708"/>
-            <a:ext cx="553915" cy="675084"/>
+          <a:xfrm flipH="1">
+            <a:off x="4423350" y="5628691"/>
+            <a:ext cx="3246768" cy="1665009"/>
           </a:xfrm>
           <a:prstGeom prst="rect">
             <a:avLst/>
           </a:prstGeom>
         </p:spPr>
       </p:pic>
-      <p:pic>
-        <p:nvPicPr>
-          <p:cNvPr id="47" name="Picture 46" descr="A picture containing chart&#10;&#10;Description automatically generated">
-            <a:extLst>
-              <a:ext uri="{FF2B5EF4-FFF2-40B4-BE49-F238E27FC236}">
-                <a16:creationId xmlns:a16="http://schemas.microsoft.com/office/drawing/2014/main" id="{49A76444-AF8A-2151-ED6D-22B08BE7CF9D}"/>
-              </a:ext>
-            </a:extLst>
-          </p:cNvPr>
-          <p:cNvPicPr>
-            <a:picLocks noChangeAspect="1"/>
-          </p:cNvPicPr>
-          <p:nvPr/>
-        </p:nvPicPr>
-        <p:blipFill>
-          <a:blip r:embed="rId6">
-            <a:extLst>
-              <a:ext uri="{28A0092B-C50C-407E-A947-70E740481C1C}">
-                <a14:useLocalDpi xmlns:a14="http://schemas.microsoft.com/office/drawing/2010/main" val="0"/>
-              </a:ext>
-            </a:extLst>
-          </a:blip>
-          <a:stretch>
-            <a:fillRect/>
-          </a:stretch>
-        </p:blipFill>
-        <p:spPr>
-          <a:xfrm>
-            <a:off x="3988918" y="2166183"/>
-            <a:ext cx="553915" cy="675084"/>
-          </a:xfrm>
-          <a:prstGeom prst="rect">
-            <a:avLst/>
-          </a:prstGeom>
-        </p:spPr>
-      </p:pic>
-      <p:sp>
-        <p:nvSpPr>
-          <p:cNvPr id="2" name="Oval 1">
-            <a:extLst>
-              <a:ext uri="{FF2B5EF4-FFF2-40B4-BE49-F238E27FC236}">
-                <a16:creationId xmlns:a16="http://schemas.microsoft.com/office/drawing/2014/main" id="{93D47F4D-5C07-9EC0-EB83-D271D81A4C75}"/>
+      <p:sp>
+        <p:nvSpPr>
+          <p:cNvPr id="15" name="Star: 7 Points 14">
+            <a:extLst>
+              <a:ext uri="{FF2B5EF4-FFF2-40B4-BE49-F238E27FC236}">
+                <a16:creationId xmlns:a16="http://schemas.microsoft.com/office/drawing/2014/main" id="{518E985D-FE8B-9FD1-3147-DA50197A5B90}"/>
               </a:ext>
             </a:extLst>
           </p:cNvPr>
@@ -6155,24 +7752,22 @@
         </p:nvSpPr>
         <p:spPr>
           <a:xfrm>
-            <a:off x="3165805" y="2184217"/>
-            <a:ext cx="553915" cy="573654"/>
-          </a:xfrm>
-          <a:prstGeom prst="ellipse">
+            <a:off x="3011376" y="2098529"/>
+            <a:ext cx="862772" cy="713711"/>
+          </a:xfrm>
+          <a:prstGeom prst="star7">
             <a:avLst/>
           </a:prstGeom>
         </p:spPr>
         <p:style>
-          <a:lnRef idx="2">
-            <a:schemeClr val="accent3">
-              <a:shade val="50000"/>
-            </a:schemeClr>
+          <a:lnRef idx="1">
+            <a:schemeClr val="accent4"/>
           </a:lnRef>
-          <a:fillRef idx="1">
-            <a:schemeClr val="accent3"/>
+          <a:fillRef idx="3">
+            <a:schemeClr val="accent4"/>
           </a:fillRef>
-          <a:effectRef idx="0">
-            <a:schemeClr val="accent3"/>
+          <a:effectRef idx="2">
+            <a:schemeClr val="accent4"/>
           </a:effectRef>
           <a:fontRef idx="minor">
             <a:schemeClr val="lt1"/>
@@ -6184,141 +7779,10 @@
           <a:p>
             <a:pPr algn="ctr"/>
             <a:r>
-              <a:rPr lang="en-US" dirty="0"/>
+              <a:rPr lang="en-US" sz="3200" dirty="0">
+                <a:latin typeface="Algerian" panose="04020705040A02060702" pitchFamily="82" charset="0"/>
+              </a:rPr>
               <a:t>L</a:t>
-            </a:r>
-          </a:p>
-        </p:txBody>
-      </p:sp>
-      <p:sp>
-        <p:nvSpPr>
-          <p:cNvPr id="3" name="TextBox 2">
-            <a:extLst>
-              <a:ext uri="{FF2B5EF4-FFF2-40B4-BE49-F238E27FC236}">
-                <a16:creationId xmlns:a16="http://schemas.microsoft.com/office/drawing/2014/main" id="{80FEFECF-586B-045B-3270-74A4243DC962}"/>
-              </a:ext>
-            </a:extLst>
-          </p:cNvPr>
-          <p:cNvSpPr txBox="1"/>
-          <p:nvPr/>
-        </p:nvSpPr>
-        <p:spPr>
-          <a:xfrm>
-            <a:off x="4096197" y="1385054"/>
-            <a:ext cx="1726885" cy="646331"/>
-          </a:xfrm>
-          <a:prstGeom prst="rect">
-            <a:avLst/>
-          </a:prstGeom>
-          <a:noFill/>
-        </p:spPr>
-        <p:txBody>
-          <a:bodyPr wrap="square" rtlCol="0">
-            <a:spAutoFit/>
-          </a:bodyPr>
-          <a:lstStyle/>
-          <a:p>
-            <a:r>
-              <a:rPr lang="en-US" dirty="0"/>
-              <a:t>Left joystick for movement</a:t>
-            </a:r>
-          </a:p>
-        </p:txBody>
-      </p:sp>
-      <p:sp>
-        <p:nvSpPr>
-          <p:cNvPr id="4" name="TextBox 3">
-            <a:extLst>
-              <a:ext uri="{FF2B5EF4-FFF2-40B4-BE49-F238E27FC236}">
-                <a16:creationId xmlns:a16="http://schemas.microsoft.com/office/drawing/2014/main" id="{3559E171-9AC3-2489-84AE-28BAECEABF09}"/>
-              </a:ext>
-            </a:extLst>
-          </p:cNvPr>
-          <p:cNvSpPr txBox="1"/>
-          <p:nvPr/>
-        </p:nvSpPr>
-        <p:spPr>
-          <a:xfrm>
-            <a:off x="438796" y="7495504"/>
-            <a:ext cx="2918495" cy="923330"/>
-          </a:xfrm>
-          <a:prstGeom prst="rect">
-            <a:avLst/>
-          </a:prstGeom>
-          <a:noFill/>
-        </p:spPr>
-        <p:txBody>
-          <a:bodyPr wrap="square" rtlCol="0">
-            <a:spAutoFit/>
-          </a:bodyPr>
-          <a:lstStyle/>
-          <a:p>
-            <a:r>
-              <a:rPr lang="en-US" dirty="0"/>
-              <a:t>Plus (switch controller)</a:t>
-            </a:r>
-          </a:p>
-          <a:p>
-            <a:r>
-              <a:rPr lang="en-US" dirty="0"/>
-              <a:t>Start (</a:t>
-            </a:r>
-            <a:r>
-              <a:rPr lang="en-US" dirty="0" err="1"/>
-              <a:t>xbox</a:t>
-            </a:r>
-            <a:r>
-              <a:rPr lang="en-US" dirty="0"/>
-              <a:t>)</a:t>
-            </a:r>
-          </a:p>
-          <a:p>
-            <a:r>
-              <a:rPr lang="en-US" dirty="0"/>
-              <a:t>Pause/Options (</a:t>
-            </a:r>
-            <a:r>
-              <a:rPr lang="en-US" dirty="0" err="1"/>
-              <a:t>playstation</a:t>
-            </a:r>
-            <a:r>
-              <a:rPr lang="en-US" dirty="0"/>
-              <a:t>)</a:t>
-            </a:r>
-          </a:p>
-        </p:txBody>
-      </p:sp>
-      <p:sp>
-        <p:nvSpPr>
-          <p:cNvPr id="5" name="TextBox 4">
-            <a:extLst>
-              <a:ext uri="{FF2B5EF4-FFF2-40B4-BE49-F238E27FC236}">
-                <a16:creationId xmlns:a16="http://schemas.microsoft.com/office/drawing/2014/main" id="{F4D45BA0-4DAF-01DD-6149-F06CAB651655}"/>
-              </a:ext>
-            </a:extLst>
-          </p:cNvPr>
-          <p:cNvSpPr txBox="1"/>
-          <p:nvPr/>
-        </p:nvSpPr>
-        <p:spPr>
-          <a:xfrm>
-            <a:off x="3396147" y="7772503"/>
-            <a:ext cx="1716766" cy="369332"/>
-          </a:xfrm>
-          <a:prstGeom prst="rect">
-            <a:avLst/>
-          </a:prstGeom>
-          <a:noFill/>
-        </p:spPr>
-        <p:txBody>
-          <a:bodyPr wrap="square" rtlCol="0">
-            <a:spAutoFit/>
-          </a:bodyPr>
-          <a:lstStyle/>
-          <a:p>
-            <a:r>
-              <a:rPr lang="en-US" dirty="0"/>
-              <a:t>=    Pause Menu</a:t>
             </a:r>
           </a:p>
         </p:txBody>

</xml_diff>

<commit_message>
fixed a text box
</commit_message>
<xml_diff>
--- a/Manual assets/maNUAL.pptx
+++ b/Manual assets/maNUAL.pptx
@@ -4825,12 +4825,7 @@
           <a:prstGeom prst="rect">
             <a:avLst/>
           </a:prstGeom>
-          <a:solidFill>
-            <a:schemeClr val="tx2">
-              <a:lumMod val="60000"/>
-              <a:lumOff val="40000"/>
-            </a:schemeClr>
-          </a:solidFill>
+          <a:noFill/>
         </p:spPr>
         <p:txBody>
           <a:bodyPr wrap="square" rtlCol="0">
@@ -4844,7 +4839,7 @@
                 <a:latin typeface="Times New Roman" panose="02020603050405020304" pitchFamily="18" charset="0"/>
                 <a:cs typeface="Times New Roman" panose="02020603050405020304" pitchFamily="18" charset="0"/>
               </a:rPr>
-              <a:t>Confused, Craig has entered a frenzy due to being transport here.</a:t>
+              <a:t>Confused, Craig has entered a frenzy due to being transported here.</a:t>
             </a:r>
           </a:p>
           <a:p>

</xml_diff>

<commit_message>
update manual before build prep
</commit_message>
<xml_diff>
--- a/Manual assets/maNUAL.pptx
+++ b/Manual assets/maNUAL.pptx
@@ -230,7 +230,7 @@
           <a:p>
             <a:fld id="{EE925A61-AA46-415A-BCE7-79C31DFEF946}" type="datetimeFigureOut">
               <a:rPr lang="en-US" smtClean="0"/>
-              <a:t>1/12/2023</a:t>
+              <a:t>1/13/2023</a:t>
             </a:fld>
             <a:endParaRPr lang="en-US"/>
           </a:p>
@@ -407,7 +407,7 @@
           <a:p>
             <a:fld id="{03E1A8B6-03F1-4F47-9B71-71E95E05BBC2}" type="datetimeFigureOut">
               <a:rPr lang="en-US" smtClean="0"/>
-              <a:t>1/12/2023</a:t>
+              <a:t>1/13/2023</a:t>
             </a:fld>
             <a:endParaRPr lang="en-US"/>
           </a:p>
@@ -1156,7 +1156,7 @@
           <a:p>
             <a:fld id="{B903D72C-80A7-40E3-B3FB-899225B9DF94}" type="datetimeFigureOut">
               <a:rPr lang="en-US" smtClean="0"/>
-              <a:t>1/12/2023</a:t>
+              <a:t>1/13/2023</a:t>
             </a:fld>
             <a:endParaRPr lang="en-US"/>
           </a:p>
@@ -1326,7 +1326,7 @@
           <a:p>
             <a:fld id="{B903D72C-80A7-40E3-B3FB-899225B9DF94}" type="datetimeFigureOut">
               <a:rPr lang="en-US" smtClean="0"/>
-              <a:t>1/12/2023</a:t>
+              <a:t>1/13/2023</a:t>
             </a:fld>
             <a:endParaRPr lang="en-US"/>
           </a:p>
@@ -1506,7 +1506,7 @@
           <a:p>
             <a:fld id="{B903D72C-80A7-40E3-B3FB-899225B9DF94}" type="datetimeFigureOut">
               <a:rPr lang="en-US" smtClean="0"/>
-              <a:t>1/12/2023</a:t>
+              <a:t>1/13/2023</a:t>
             </a:fld>
             <a:endParaRPr lang="en-US"/>
           </a:p>
@@ -1676,7 +1676,7 @@
           <a:p>
             <a:fld id="{B903D72C-80A7-40E3-B3FB-899225B9DF94}" type="datetimeFigureOut">
               <a:rPr lang="en-US" smtClean="0"/>
-              <a:t>1/12/2023</a:t>
+              <a:t>1/13/2023</a:t>
             </a:fld>
             <a:endParaRPr lang="en-US"/>
           </a:p>
@@ -1920,7 +1920,7 @@
           <a:p>
             <a:fld id="{B903D72C-80A7-40E3-B3FB-899225B9DF94}" type="datetimeFigureOut">
               <a:rPr lang="en-US" smtClean="0"/>
-              <a:t>1/12/2023</a:t>
+              <a:t>1/13/2023</a:t>
             </a:fld>
             <a:endParaRPr lang="en-US"/>
           </a:p>
@@ -2152,7 +2152,7 @@
           <a:p>
             <a:fld id="{B903D72C-80A7-40E3-B3FB-899225B9DF94}" type="datetimeFigureOut">
               <a:rPr lang="en-US" smtClean="0"/>
-              <a:t>1/12/2023</a:t>
+              <a:t>1/13/2023</a:t>
             </a:fld>
             <a:endParaRPr lang="en-US"/>
           </a:p>
@@ -2519,7 +2519,7 @@
           <a:p>
             <a:fld id="{B903D72C-80A7-40E3-B3FB-899225B9DF94}" type="datetimeFigureOut">
               <a:rPr lang="en-US" smtClean="0"/>
-              <a:t>1/12/2023</a:t>
+              <a:t>1/13/2023</a:t>
             </a:fld>
             <a:endParaRPr lang="en-US"/>
           </a:p>
@@ -2637,7 +2637,7 @@
           <a:p>
             <a:fld id="{B903D72C-80A7-40E3-B3FB-899225B9DF94}" type="datetimeFigureOut">
               <a:rPr lang="en-US" smtClean="0"/>
-              <a:t>1/12/2023</a:t>
+              <a:t>1/13/2023</a:t>
             </a:fld>
             <a:endParaRPr lang="en-US"/>
           </a:p>
@@ -2732,7 +2732,7 @@
           <a:p>
             <a:fld id="{B903D72C-80A7-40E3-B3FB-899225B9DF94}" type="datetimeFigureOut">
               <a:rPr lang="en-US" smtClean="0"/>
-              <a:t>1/12/2023</a:t>
+              <a:t>1/13/2023</a:t>
             </a:fld>
             <a:endParaRPr lang="en-US"/>
           </a:p>
@@ -3009,7 +3009,7 @@
           <a:p>
             <a:fld id="{B903D72C-80A7-40E3-B3FB-899225B9DF94}" type="datetimeFigureOut">
               <a:rPr lang="en-US" smtClean="0"/>
-              <a:t>1/12/2023</a:t>
+              <a:t>1/13/2023</a:t>
             </a:fld>
             <a:endParaRPr lang="en-US"/>
           </a:p>
@@ -3266,7 +3266,7 @@
           <a:p>
             <a:fld id="{B903D72C-80A7-40E3-B3FB-899225B9DF94}" type="datetimeFigureOut">
               <a:rPr lang="en-US" smtClean="0"/>
-              <a:t>1/12/2023</a:t>
+              <a:t>1/13/2023</a:t>
             </a:fld>
             <a:endParaRPr lang="en-US"/>
           </a:p>
@@ -3479,7 +3479,7 @@
           <a:p>
             <a:fld id="{B903D72C-80A7-40E3-B3FB-899225B9DF94}" type="datetimeFigureOut">
               <a:rPr lang="en-US" smtClean="0"/>
-              <a:t>1/12/2023</a:t>
+              <a:t>1/13/2023</a:t>
             </a:fld>
             <a:endParaRPr lang="en-US"/>
           </a:p>
@@ -4147,15 +4147,7 @@
             </a:pPr>
             <a:r>
               <a:rPr lang="en-US" dirty="0"/>
-              <a:t>For generations they ruled the land with grace and dignity. Prince </a:t>
-            </a:r>
-            <a:r>
-              <a:rPr lang="en-US" dirty="0" err="1"/>
-              <a:t>SkullCuddel</a:t>
-            </a:r>
-            <a:r>
-              <a:rPr lang="en-US" dirty="0"/>
-              <a:t> the second son upon hearing he would not become king made a deal with a Witch to turn all his subjects into monsters in return he would become powerful far beyond any human limitation. </a:t>
+              <a:t>For generations they ruled the land with grace and dignity. Prince Skull, the second son, upon hearing he would not become king made a deal with a Witch to turn all his subjects into monsters. In return, he would become powerful far beyond any human limitation. </a:t>
             </a:r>
           </a:p>
           <a:p>
@@ -4166,6 +4158,54 @@
               <a:rPr lang="en-US" dirty="0"/>
               <a:t>	For years the citizens wandered the hall of the great tower and the surrounding forest in search of a cure but soon all of them lost their minds.</a:t>
             </a:r>
+          </a:p>
+        </p:txBody>
+      </p:sp>
+      <p:sp>
+        <p:nvSpPr>
+          <p:cNvPr id="4" name="Rectangle: Rounded Corners 3">
+            <a:extLst>
+              <a:ext uri="{FF2B5EF4-FFF2-40B4-BE49-F238E27FC236}">
+                <a16:creationId xmlns:a16="http://schemas.microsoft.com/office/drawing/2014/main" id="{88817C32-0696-7997-A9C9-B83969144FA7}"/>
+              </a:ext>
+            </a:extLst>
+          </p:cNvPr>
+          <p:cNvSpPr/>
+          <p:nvPr/>
+        </p:nvSpPr>
+        <p:spPr>
+          <a:xfrm>
+            <a:off x="2509942" y="7685108"/>
+            <a:ext cx="6081251" cy="1393371"/>
+          </a:xfrm>
+          <a:prstGeom prst="roundRect">
+            <a:avLst>
+              <a:gd name="adj" fmla="val 50000"/>
+            </a:avLst>
+          </a:prstGeom>
+        </p:spPr>
+        <p:style>
+          <a:lnRef idx="2">
+            <a:schemeClr val="accent1">
+              <a:shade val="50000"/>
+            </a:schemeClr>
+          </a:lnRef>
+          <a:fillRef idx="1">
+            <a:schemeClr val="accent1"/>
+          </a:fillRef>
+          <a:effectRef idx="0">
+            <a:schemeClr val="accent1"/>
+          </a:effectRef>
+          <a:fontRef idx="minor">
+            <a:schemeClr val="lt1"/>
+          </a:fontRef>
+        </p:style>
+        <p:txBody>
+          <a:bodyPr rtlCol="0" anchor="ctr"/>
+          <a:lstStyle/>
+          <a:p>
+            <a:pPr algn="ctr"/>
+            <a:endParaRPr lang="en-US"/>
           </a:p>
         </p:txBody>
       </p:sp>
@@ -4682,7 +4722,7 @@
                 <a:latin typeface="Times New Roman" panose="02020603050405020304" pitchFamily="18" charset="0"/>
                 <a:cs typeface="Times New Roman" panose="02020603050405020304" pitchFamily="18" charset="0"/>
               </a:rPr>
-              <a:t>He’s a 47-year-old balding American who suddenly found himself in the middle of a forest</a:t>
+              <a:t>He’s a 47-year-old balding American who suddenly found himself in the middle of a mysterious forest</a:t>
             </a:r>
           </a:p>
         </p:txBody>
@@ -5211,7 +5251,7 @@
         <p:spPr>
           <a:xfrm>
             <a:off x="471490" y="3769895"/>
-            <a:ext cx="2608594" cy="2862322"/>
+            <a:ext cx="2608594" cy="2585323"/>
           </a:xfrm>
           <a:prstGeom prst="rect">
             <a:avLst/>
@@ -5236,7 +5276,7 @@
                 <a:latin typeface="Times New Roman" panose="02020603050405020304" pitchFamily="18" charset="0"/>
                 <a:cs typeface="Times New Roman" panose="02020603050405020304" pitchFamily="18" charset="0"/>
               </a:rPr>
-              <a:t>: Honestly, these guys would be friendly but panic far too easily after they start panicking, they fire rocks out of their mouth. Be careful, while Craig can cut down these rocks, goblins can fire faster than he can swing.</a:t>
+              <a:t>: These monsters by far got the worst end of the whole cure ordeal, being given a weakened body and a panicked mind. The only thing they have left is their ability to spit rocks.</a:t>
             </a:r>
           </a:p>
           <a:p>
@@ -5734,7 +5774,7 @@
         <p:spPr>
           <a:xfrm>
             <a:off x="278478" y="6062798"/>
-            <a:ext cx="5550568" cy="1754326"/>
+            <a:ext cx="5550568" cy="1477328"/>
           </a:xfrm>
           <a:prstGeom prst="rect">
             <a:avLst/>
@@ -5759,7 +5799,7 @@
                 <a:latin typeface="Times New Roman" panose="02020603050405020304" pitchFamily="18" charset="0"/>
                 <a:cs typeface="Times New Roman" panose="02020603050405020304" pitchFamily="18" charset="0"/>
               </a:rPr>
-              <a:t>: they formerly held positions of great power. The one Foe to not have lost their mind, although their minds have been corrupted by The Witch. Able to spawn an explosion below the player, these dastardly dudes disappear from one destination to another.</a:t>
+              <a:t>: they formerly held positions of great power. The one Foe to not have lost their mind. Able to spawn an explosion below the player, these dastardly dudes disappear from one destination to another.</a:t>
             </a:r>
           </a:p>
           <a:p>
@@ -7497,45 +7537,6 @@
       </p:sp>
       <p:sp>
         <p:nvSpPr>
-          <p:cNvPr id="56" name="TextBox 55">
-            <a:extLst>
-              <a:ext uri="{FF2B5EF4-FFF2-40B4-BE49-F238E27FC236}">
-                <a16:creationId xmlns:a16="http://schemas.microsoft.com/office/drawing/2014/main" id="{C1CEE3DB-1EF4-80C5-B1B2-27EC54308753}"/>
-              </a:ext>
-            </a:extLst>
-          </p:cNvPr>
-          <p:cNvSpPr txBox="1"/>
-          <p:nvPr/>
-        </p:nvSpPr>
-        <p:spPr>
-          <a:xfrm flipH="1">
-            <a:off x="85053" y="1594776"/>
-            <a:ext cx="2191286" cy="923330"/>
-          </a:xfrm>
-          <a:prstGeom prst="rect">
-            <a:avLst/>
-          </a:prstGeom>
-          <a:noFill/>
-        </p:spPr>
-        <p:txBody>
-          <a:bodyPr wrap="square" rtlCol="0">
-            <a:spAutoFit/>
-          </a:bodyPr>
-          <a:lstStyle/>
-          <a:p>
-            <a:pPr algn="ctr"/>
-            <a:r>
-              <a:rPr lang="en-US" dirty="0">
-                <a:latin typeface="Times New Roman" panose="02020603050405020304" pitchFamily="18" charset="0"/>
-                <a:cs typeface="Times New Roman" panose="02020603050405020304" pitchFamily="18" charset="0"/>
-              </a:rPr>
-              <a:t>These Controls are for when you're using a controller</a:t>
-            </a:r>
-          </a:p>
-        </p:txBody>
-      </p:sp>
-      <p:sp>
-        <p:nvSpPr>
           <p:cNvPr id="57" name="TextBox 56">
             <a:extLst>
               <a:ext uri="{FF2B5EF4-FFF2-40B4-BE49-F238E27FC236}">
@@ -7665,7 +7666,7 @@
         </p:nvSpPr>
         <p:spPr>
           <a:xfrm flipH="1">
-            <a:off x="4021616" y="3838190"/>
+            <a:off x="4021616" y="4030554"/>
             <a:ext cx="2191286" cy="646331"/>
           </a:xfrm>
           <a:prstGeom prst="rect">
@@ -7693,7 +7694,7 @@
                 <a:latin typeface="Times New Roman" panose="02020603050405020304" pitchFamily="18" charset="0"/>
                 <a:cs typeface="Times New Roman" panose="02020603050405020304" pitchFamily="18" charset="0"/>
               </a:rPr>
-              <a:t>    (not triggers!)</a:t>
+              <a:t> </a:t>
             </a:r>
           </a:p>
         </p:txBody>
@@ -8340,6 +8341,58 @@
                 <a:latin typeface="Algerian" panose="04020705040A02060702" pitchFamily="82" charset="0"/>
               </a:rPr>
               <a:t>L</a:t>
+            </a:r>
+          </a:p>
+        </p:txBody>
+      </p:sp>
+      <p:sp>
+        <p:nvSpPr>
+          <p:cNvPr id="2" name="TextBox 1">
+            <a:extLst>
+              <a:ext uri="{FF2B5EF4-FFF2-40B4-BE49-F238E27FC236}">
+                <a16:creationId xmlns:a16="http://schemas.microsoft.com/office/drawing/2014/main" id="{2659288C-2AC2-582D-4BE9-CF81A142BF7C}"/>
+              </a:ext>
+            </a:extLst>
+          </p:cNvPr>
+          <p:cNvSpPr txBox="1"/>
+          <p:nvPr/>
+        </p:nvSpPr>
+        <p:spPr>
+          <a:xfrm>
+            <a:off x="144149" y="1640938"/>
+            <a:ext cx="2191286" cy="923330"/>
+          </a:xfrm>
+          <a:prstGeom prst="rect">
+            <a:avLst/>
+          </a:prstGeom>
+        </p:spPr>
+        <p:style>
+          <a:lnRef idx="1">
+            <a:schemeClr val="dk1"/>
+          </a:lnRef>
+          <a:fillRef idx="2">
+            <a:schemeClr val="dk1"/>
+          </a:fillRef>
+          <a:effectRef idx="1">
+            <a:schemeClr val="dk1"/>
+          </a:effectRef>
+          <a:fontRef idx="minor">
+            <a:schemeClr val="dk1"/>
+          </a:fontRef>
+        </p:style>
+        <p:txBody>
+          <a:bodyPr wrap="square" rtlCol="0">
+            <a:spAutoFit/>
+          </a:bodyPr>
+          <a:lstStyle/>
+          <a:p>
+            <a:pPr algn="ctr"/>
+            <a:r>
+              <a:rPr lang="en-US" dirty="0">
+                <a:latin typeface="Times New Roman" panose="02020603050405020304" pitchFamily="18" charset="0"/>
+                <a:cs typeface="Times New Roman" panose="02020603050405020304" pitchFamily="18" charset="0"/>
+              </a:rPr>
+              <a:t>These Controls are for when you're using a controller</a:t>
             </a:r>
           </a:p>
         </p:txBody>

</xml_diff>

<commit_message>
final changes to manual
</commit_message>
<xml_diff>
--- a/Manual assets/maNUAL.pptx
+++ b/Manual assets/maNUAL.pptx
@@ -4098,7 +4098,7 @@
               <a:rPr lang="en-US" sz="2400" dirty="0">
                 <a:latin typeface="Arial Narrow" panose="020B0606020202030204" pitchFamily="34" charset="0"/>
               </a:rPr>
-              <a:t>The Official strategy guide Written by :Anne Mole</a:t>
+              <a:t>The Official strategy guide Written by: Anmol</a:t>
             </a:r>
           </a:p>
           <a:p>
@@ -4512,15 +4512,7 @@
           <a:p>
             <a:r>
               <a:rPr lang="en-US" sz="2000" dirty="0"/>
-              <a:t>For generations they ruled the land with grace and dignity. Prince </a:t>
-            </a:r>
-            <a:r>
-              <a:rPr lang="en-US" sz="2000" dirty="0" err="1"/>
-              <a:t>SkullCuddle</a:t>
-            </a:r>
-            <a:r>
-              <a:rPr lang="en-US" sz="2000" dirty="0"/>
-              <a:t>, the second son, upon hearing he would not become king made a deal with a Witch to turn all his subjects into monsters. In return, he would become powerful far beyond any human’s comprehension. </a:t>
+              <a:t>For generations they ruled the land with grace and dignity. Prince Skull, the second son, upon hearing he would not become king made a deal with a Witch to turn all his subjects into monsters. In return, he would become powerful far beyond any human’s comprehension. </a:t>
             </a:r>
           </a:p>
           <a:p>
@@ -5742,7 +5734,7 @@
                 <a:latin typeface="Times New Roman" panose="02020603050405020304" pitchFamily="18" charset="0"/>
                 <a:cs typeface="Times New Roman" panose="02020603050405020304" pitchFamily="18" charset="0"/>
               </a:rPr>
-              <a:t>: These monsters by far got the worst end of the whole cure ordeal, being given a weakened body and a panicked mind. The only thing they have left is their ability to spit rocks.</a:t>
+              <a:t>: These monsters by far got the worst end of the whole curse ordeal, being given a weakened body and a panicked mind. The only thing they have left is their ability to spit rocks.</a:t>
             </a:r>
           </a:p>
           <a:p>

</xml_diff>